<commit_message>
Add performance example slide
</commit_message>
<xml_diff>
--- a/Optimization/performance_measures.pptx
+++ b/Optimization/performance_measures.pptx
@@ -9,6 +9,7 @@
     <p:sldId id="258" r:id="rId3"/>
     <p:sldId id="259" r:id="rId4"/>
     <p:sldId id="260" r:id="rId5"/>
+    <p:sldId id="261" r:id="rId6"/>
   </p:sldIdLst>
   <p:sldSz cx="9144000" cy="6858000" type="screen4x3"/>
   <p:notesSz cx="6858000" cy="9144000"/>
@@ -107,6 +108,11 @@
       </a:defRPr>
     </a:lvl9pPr>
   </p:defaultTextStyle>
+  <p:extLst>
+    <p:ext uri="{EFAFB233-063F-42B5-8137-9DF3F51BA10A}">
+      <p15:sldGuideLst xmlns:p15="http://schemas.microsoft.com/office/powerpoint/2012/main"/>
+    </p:ext>
+  </p:extLst>
 </p:presentation>
 </file>
 
@@ -291,7 +297,7 @@
           <a:p>
             <a:fld id="{1CFF3F78-F57F-4409-A41B-5EC46D4F404B}" type="datetime1">
               <a:rPr lang="nl-BE" smtClean="0"/>
-              <a:t>17/01/2018</a:t>
+              <a:t>18/01/2018</a:t>
             </a:fld>
             <a:endParaRPr lang="nl-BE"/>
           </a:p>
@@ -461,7 +467,7 @@
           <a:p>
             <a:fld id="{7D029E61-52E3-412C-82EB-2F81B17C0AF1}" type="datetime1">
               <a:rPr lang="nl-BE" smtClean="0"/>
-              <a:t>17/01/2018</a:t>
+              <a:t>18/01/2018</a:t>
             </a:fld>
             <a:endParaRPr lang="nl-BE"/>
           </a:p>
@@ -641,7 +647,7 @@
           <a:p>
             <a:fld id="{A83F1CEF-A38E-4001-89C6-F3FC7784F299}" type="datetime1">
               <a:rPr lang="nl-BE" smtClean="0"/>
-              <a:t>17/01/2018</a:t>
+              <a:t>18/01/2018</a:t>
             </a:fld>
             <a:endParaRPr lang="nl-BE"/>
           </a:p>
@@ -767,7 +773,7 @@
           <a:p>
             <a:fld id="{1FDE84DB-AADA-4C3F-BF46-CA664A504479}" type="datetime1">
               <a:rPr lang="nl-BE" smtClean="0"/>
-              <a:t>17/01/2018</a:t>
+              <a:t>18/01/2018</a:t>
             </a:fld>
             <a:endParaRPr lang="nl-BE" dirty="0"/>
           </a:p>
@@ -1011,7 +1017,7 @@
           <a:p>
             <a:fld id="{8CD53A43-C15C-4F05-9AD7-DB9DE837084D}" type="datetime1">
               <a:rPr lang="nl-BE" smtClean="0"/>
-              <a:t>17/01/2018</a:t>
+              <a:t>18/01/2018</a:t>
             </a:fld>
             <a:endParaRPr lang="nl-BE"/>
           </a:p>
@@ -1257,7 +1263,7 @@
           <a:p>
             <a:fld id="{8994D238-D949-4AEF-9753-A8B6EFA964A0}" type="datetime1">
               <a:rPr lang="nl-BE" smtClean="0"/>
-              <a:t>17/01/2018</a:t>
+              <a:t>18/01/2018</a:t>
             </a:fld>
             <a:endParaRPr lang="nl-BE"/>
           </a:p>
@@ -1545,7 +1551,7 @@
           <a:p>
             <a:fld id="{4D234023-BF99-4AD0-835E-8125DA2B6664}" type="datetime1">
               <a:rPr lang="nl-BE" smtClean="0"/>
-              <a:t>17/01/2018</a:t>
+              <a:t>18/01/2018</a:t>
             </a:fld>
             <a:endParaRPr lang="nl-BE"/>
           </a:p>
@@ -1967,7 +1973,7 @@
           <a:p>
             <a:fld id="{DB075A73-5C1D-406E-9444-3C5C58580E8E}" type="datetime1">
               <a:rPr lang="nl-BE" smtClean="0"/>
-              <a:t>17/01/2018</a:t>
+              <a:t>18/01/2018</a:t>
             </a:fld>
             <a:endParaRPr lang="nl-BE"/>
           </a:p>
@@ -2085,7 +2091,7 @@
           <a:p>
             <a:fld id="{E111FB2D-2E17-4D8F-A64A-4EB0C3D12494}" type="datetime1">
               <a:rPr lang="nl-BE" smtClean="0"/>
-              <a:t>17/01/2018</a:t>
+              <a:t>18/01/2018</a:t>
             </a:fld>
             <a:endParaRPr lang="nl-BE"/>
           </a:p>
@@ -2180,7 +2186,7 @@
           <a:p>
             <a:fld id="{5BE27D71-2267-4E44-9F33-05B60E5C7D9D}" type="datetime1">
               <a:rPr lang="nl-BE" smtClean="0"/>
-              <a:t>17/01/2018</a:t>
+              <a:t>18/01/2018</a:t>
             </a:fld>
             <a:endParaRPr lang="nl-BE"/>
           </a:p>
@@ -2457,7 +2463,7 @@
           <a:p>
             <a:fld id="{182F587C-96C8-4813-A767-3084061A3229}" type="datetime1">
               <a:rPr lang="nl-BE" smtClean="0"/>
-              <a:t>17/01/2018</a:t>
+              <a:t>18/01/2018</a:t>
             </a:fld>
             <a:endParaRPr lang="nl-BE"/>
           </a:p>
@@ -2710,7 +2716,7 @@
           <a:p>
             <a:fld id="{8B021CF8-BBBB-4DFA-8713-49842AA07274}" type="datetime1">
               <a:rPr lang="nl-BE" smtClean="0"/>
-              <a:t>17/01/2018</a:t>
+              <a:t>18/01/2018</a:t>
             </a:fld>
             <a:endParaRPr lang="nl-BE"/>
           </a:p>
@@ -2923,7 +2929,7 @@
           <a:p>
             <a:fld id="{CDBFABB5-0AB3-4CB6-A705-6887DEB1F9F2}" type="datetime1">
               <a:rPr lang="nl-BE" smtClean="0"/>
-              <a:t>17/01/2018</a:t>
+              <a:t>18/01/2018</a:t>
             </a:fld>
             <a:endParaRPr lang="nl-BE"/>
           </a:p>
@@ -3656,8 +3662,8 @@
           </a:p>
         </p:txBody>
       </p:sp>
-      <mc:AlternateContent xmlns:mc="http://schemas.openxmlformats.org/markup-compatibility/2006">
-        <mc:Choice xmlns:a14="http://schemas.microsoft.com/office/drawing/2010/main" Requires="a14">
+      <mc:AlternateContent xmlns:mc="http://schemas.openxmlformats.org/markup-compatibility/2006" xmlns:a14="http://schemas.microsoft.com/office/drawing/2010/main">
+        <mc:Choice Requires="a14">
           <p:sp>
             <p:nvSpPr>
               <p:cNvPr id="7" name="TextBox 6"/>
@@ -3680,6 +3686,7 @@
               </a:bodyPr>
               <a:lstStyle/>
               <a:p>
+                <a:pPr/>
                 <a14:m>
                   <m:oMathPara xmlns:m="http://schemas.openxmlformats.org/officeDocument/2006/math">
                     <m:oMathParaPr>
@@ -3797,7 +3804,7 @@
             </p:txBody>
           </p:sp>
         </mc:Choice>
-        <mc:Fallback>
+        <mc:Fallback xmlns="">
           <p:sp>
             <p:nvSpPr>
               <p:cNvPr id="7" name="TextBox 6"/>
@@ -4309,8 +4316,8 @@
           </a:p>
         </p:txBody>
       </p:sp>
-      <mc:AlternateContent xmlns:mc="http://schemas.openxmlformats.org/markup-compatibility/2006">
-        <mc:Choice xmlns:a14="http://schemas.microsoft.com/office/drawing/2010/main" Requires="a14">
+      <mc:AlternateContent xmlns:mc="http://schemas.openxmlformats.org/markup-compatibility/2006" xmlns:a14="http://schemas.microsoft.com/office/drawing/2010/main">
+        <mc:Choice Requires="a14">
           <p:sp>
             <p:nvSpPr>
               <p:cNvPr id="5" name="TextBox 4"/>
@@ -4333,6 +4340,7 @@
               </a:bodyPr>
               <a:lstStyle/>
               <a:p>
+                <a:pPr/>
                 <a14:m>
                   <m:oMathPara xmlns:m="http://schemas.openxmlformats.org/officeDocument/2006/math">
                     <m:oMathParaPr>
@@ -4438,7 +4446,7 @@
             </p:txBody>
           </p:sp>
         </mc:Choice>
-        <mc:Fallback>
+        <mc:Fallback xmlns="">
           <p:sp>
             <p:nvSpPr>
               <p:cNvPr id="5" name="TextBox 4"/>
@@ -4477,8 +4485,8 @@
           </p:sp>
         </mc:Fallback>
       </mc:AlternateContent>
-      <mc:AlternateContent xmlns:mc="http://schemas.openxmlformats.org/markup-compatibility/2006">
-        <mc:Choice xmlns:a14="http://schemas.microsoft.com/office/drawing/2010/main" Requires="a14">
+      <mc:AlternateContent xmlns:mc="http://schemas.openxmlformats.org/markup-compatibility/2006" xmlns:a14="http://schemas.microsoft.com/office/drawing/2010/main">
+        <mc:Choice Requires="a14">
           <p:sp>
             <p:nvSpPr>
               <p:cNvPr id="6" name="TextBox 5"/>
@@ -4501,6 +4509,7 @@
               </a:bodyPr>
               <a:lstStyle/>
               <a:p>
+                <a:pPr/>
                 <a14:m>
                   <m:oMathPara xmlns:m="http://schemas.openxmlformats.org/officeDocument/2006/math">
                     <m:oMathParaPr>
@@ -4572,7 +4581,7 @@
             </p:txBody>
           </p:sp>
         </mc:Choice>
-        <mc:Fallback>
+        <mc:Fallback xmlns="">
           <p:sp>
             <p:nvSpPr>
               <p:cNvPr id="6" name="TextBox 5"/>
@@ -5014,8 +5023,8 @@
           </a:p>
         </p:txBody>
       </p:sp>
-      <mc:AlternateContent xmlns:mc="http://schemas.openxmlformats.org/markup-compatibility/2006">
-        <mc:Choice xmlns:a14="http://schemas.microsoft.com/office/drawing/2010/main" Requires="a14">
+      <mc:AlternateContent xmlns:mc="http://schemas.openxmlformats.org/markup-compatibility/2006" xmlns:a14="http://schemas.microsoft.com/office/drawing/2010/main">
+        <mc:Choice Requires="a14">
           <p:sp>
             <p:nvSpPr>
               <p:cNvPr id="3" name="Content Placeholder 2"/>
@@ -5093,7 +5102,7 @@
             </p:txBody>
           </p:sp>
         </mc:Choice>
-        <mc:Fallback>
+        <mc:Fallback xmlns="">
           <p:sp>
             <p:nvSpPr>
               <p:cNvPr id="3" name="Content Placeholder 2"/>
@@ -5150,8 +5159,8 @@
           </a:p>
         </p:txBody>
       </p:sp>
-      <mc:AlternateContent xmlns:mc="http://schemas.openxmlformats.org/markup-compatibility/2006">
-        <mc:Choice xmlns:a14="http://schemas.microsoft.com/office/drawing/2010/main" Requires="a14">
+      <mc:AlternateContent xmlns:mc="http://schemas.openxmlformats.org/markup-compatibility/2006" xmlns:a14="http://schemas.microsoft.com/office/drawing/2010/main">
+        <mc:Choice Requires="a14">
           <p:sp>
             <p:nvSpPr>
               <p:cNvPr id="6" name="TextBox 5"/>
@@ -5174,6 +5183,7 @@
               </a:bodyPr>
               <a:lstStyle/>
               <a:p>
+                <a:pPr/>
                 <a14:m>
                   <m:oMathPara xmlns:m="http://schemas.openxmlformats.org/officeDocument/2006/math">
                     <m:oMathParaPr>
@@ -5286,7 +5296,7 @@
             </p:txBody>
           </p:sp>
         </mc:Choice>
-        <mc:Fallback>
+        <mc:Fallback xmlns="">
           <p:sp>
             <p:nvSpPr>
               <p:cNvPr id="6" name="TextBox 5"/>
@@ -5325,8 +5335,8 @@
           </p:sp>
         </mc:Fallback>
       </mc:AlternateContent>
-      <mc:AlternateContent xmlns:mc="http://schemas.openxmlformats.org/markup-compatibility/2006">
-        <mc:Choice xmlns:a14="http://schemas.microsoft.com/office/drawing/2010/main" Requires="a14">
+      <mc:AlternateContent xmlns:mc="http://schemas.openxmlformats.org/markup-compatibility/2006" xmlns:a14="http://schemas.microsoft.com/office/drawing/2010/main">
+        <mc:Choice Requires="a14">
           <p:sp>
             <p:nvSpPr>
               <p:cNvPr id="7" name="TextBox 6"/>
@@ -5399,7 +5409,7 @@
             </p:txBody>
           </p:sp>
         </mc:Choice>
-        <mc:Fallback>
+        <mc:Fallback xmlns="">
           <p:sp>
             <p:nvSpPr>
               <p:cNvPr id="7" name="TextBox 6"/>
@@ -5752,6 +5762,1122 @@
 </p:sld>
 </file>
 
+<file path=ppt/slides/slide5.xml><?xml version="1.0" encoding="utf-8"?>
+<p:sld xmlns:a="http://schemas.openxmlformats.org/drawingml/2006/main" xmlns:r="http://schemas.openxmlformats.org/officeDocument/2006/relationships" xmlns:p="http://schemas.openxmlformats.org/presentationml/2006/main">
+  <p:cSld>
+    <p:spTree>
+      <p:nvGrpSpPr>
+        <p:cNvPr id="1" name=""/>
+        <p:cNvGrpSpPr/>
+        <p:nvPr/>
+      </p:nvGrpSpPr>
+      <p:grpSpPr>
+        <a:xfrm>
+          <a:off x="0" y="0"/>
+          <a:ext cx="0" cy="0"/>
+          <a:chOff x="0" y="0"/>
+          <a:chExt cx="0" cy="0"/>
+        </a:xfrm>
+      </p:grpSpPr>
+      <p:sp>
+        <p:nvSpPr>
+          <p:cNvPr id="2" name="Title 1"/>
+          <p:cNvSpPr>
+            <a:spLocks noGrp="1"/>
+          </p:cNvSpPr>
+          <p:nvPr>
+            <p:ph type="title"/>
+          </p:nvPr>
+        </p:nvSpPr>
+        <p:spPr/>
+        <p:txBody>
+          <a:bodyPr/>
+          <a:lstStyle/>
+          <a:p>
+            <a:r>
+              <a:rPr lang="en-US" dirty="0" smtClean="0"/>
+              <a:t>Example</a:t>
+            </a:r>
+            <a:endParaRPr lang="en-US" dirty="0"/>
+          </a:p>
+        </p:txBody>
+      </p:sp>
+      <mc:AlternateContent xmlns:mc="http://schemas.openxmlformats.org/markup-compatibility/2006">
+        <mc:Choice xmlns:a14="http://schemas.microsoft.com/office/drawing/2010/main" Requires="a14">
+          <p:sp>
+            <p:nvSpPr>
+              <p:cNvPr id="3" name="Content Placeholder 2"/>
+              <p:cNvSpPr>
+                <a:spLocks noGrp="1"/>
+              </p:cNvSpPr>
+              <p:nvPr>
+                <p:ph idx="1"/>
+              </p:nvPr>
+            </p:nvSpPr>
+            <p:spPr>
+              <a:xfrm>
+                <a:off x="457200" y="1600200"/>
+                <a:ext cx="6660292" cy="4525963"/>
+              </a:xfrm>
+            </p:spPr>
+            <p:txBody>
+              <a:bodyPr>
+                <a:normAutofit fontScale="77500" lnSpcReduction="20000"/>
+              </a:bodyPr>
+              <a:lstStyle/>
+              <a:p>
+                <a:r>
+                  <a:rPr lang="en-US" dirty="0" smtClean="0"/>
+                  <a:t>Machine balance for dual socket </a:t>
+                </a:r>
+                <a:r>
+                  <a:rPr lang="pt-BR" dirty="0" smtClean="0"/>
+                  <a:t>Intel Xeon</a:t>
+                </a:r>
+                <a:br>
+                  <a:rPr lang="pt-BR" dirty="0" smtClean="0"/>
+                </a:br>
+                <a:r>
+                  <a:rPr lang="pt-BR" dirty="0" smtClean="0"/>
+                  <a:t>E5-2680v4 </a:t>
+                </a:r>
+                <a:r>
+                  <a:rPr lang="pt-BR" dirty="0"/>
+                  <a:t>@ </a:t>
+                </a:r>
+                <a:r>
+                  <a:rPr lang="pt-BR" dirty="0" smtClean="0"/>
+                  <a:t>2.40GHz (broadwell, AVX2)</a:t>
+                </a:r>
+                <a:endParaRPr lang="en-US" dirty="0" smtClean="0"/>
+              </a:p>
+              <a:p>
+                <a:pPr lvl="1"/>
+                <a:r>
+                  <a:rPr lang="en-US" dirty="0" smtClean="0"/>
+                  <a:t>peak performance:</a:t>
+                </a:r>
+                <a:br>
+                  <a:rPr lang="en-US" dirty="0" smtClean="0"/>
+                </a:br>
+                <a:r>
+                  <a:rPr lang="en-US" dirty="0" smtClean="0"/>
+                  <a:t>    4 </a:t>
+                </a:r>
+                <a:r>
+                  <a:rPr lang="en-US" dirty="0" err="1" smtClean="0"/>
+                  <a:t>dp</a:t>
+                </a:r>
+                <a:r>
+                  <a:rPr lang="en-US" dirty="0" smtClean="0"/>
+                  <a:t> </a:t>
+                </a:r>
+                <a:r>
+                  <a:rPr lang="en-US" dirty="0"/>
+                  <a:t>×</a:t>
+                </a:r>
+                <a:r>
+                  <a:rPr lang="en-US" dirty="0" smtClean="0"/>
+                  <a:t> 2.4∙10</a:t>
+                </a:r>
+                <a:r>
+                  <a:rPr lang="en-US" baseline="30000" dirty="0" smtClean="0"/>
+                  <a:t>9</a:t>
+                </a:r>
+                <a:r>
+                  <a:rPr lang="en-US" dirty="0" smtClean="0"/>
+                  <a:t> FLOPS/s </a:t>
+                </a:r>
+                <a:r>
+                  <a:rPr lang="en-US" dirty="0"/>
+                  <a:t>× </a:t>
+                </a:r>
+                <a:r>
+                  <a:rPr lang="en-US" dirty="0" smtClean="0"/>
+                  <a:t>14 </a:t>
+                </a:r>
+                <a:r>
+                  <a:rPr lang="en-US" dirty="0"/>
+                  <a:t>× </a:t>
+                </a:r>
+                <a:r>
+                  <a:rPr lang="en-US" dirty="0" smtClean="0"/>
+                  <a:t>2</a:t>
+                </a:r>
+                <a:br>
+                  <a:rPr lang="en-US" dirty="0" smtClean="0"/>
+                </a:br>
+                <a:r>
+                  <a:rPr lang="en-US" dirty="0" smtClean="0"/>
+                  <a:t>                 = 269 GFLOPS/s</a:t>
+                </a:r>
+              </a:p>
+              <a:p>
+                <a:pPr lvl="1"/>
+                <a:r>
+                  <a:rPr lang="en-US" dirty="0"/>
+                  <a:t>m</a:t>
+                </a:r>
+                <a:r>
+                  <a:rPr lang="en-US" dirty="0" smtClean="0"/>
+                  <a:t>emory bandwidth: 125 GB/s (vector triad)</a:t>
+                </a:r>
+              </a:p>
+              <a:p>
+                <a:pPr lvl="1"/>
+                <a:r>
+                  <a:rPr lang="en-US" dirty="0" smtClean="0"/>
+                  <a:t>Machine balance </a:t>
+                </a:r>
+                <a:r>
+                  <a:rPr lang="en-US" i="1" dirty="0" err="1" smtClean="0"/>
+                  <a:t>B</a:t>
+                </a:r>
+                <a:r>
+                  <a:rPr lang="en-US" i="1" baseline="-25000" dirty="0" err="1" smtClean="0"/>
+                  <a:t>m</a:t>
+                </a:r>
+                <a:r>
+                  <a:rPr lang="en-US" dirty="0" smtClean="0"/>
+                  <a:t> = 0.46 bytes/FLOP</a:t>
+                </a:r>
+              </a:p>
+              <a:p>
+                <a:r>
+                  <a:rPr lang="en-US" dirty="0" smtClean="0"/>
+                  <a:t>Code balance for vector triad</a:t>
+                </a:r>
+              </a:p>
+              <a:p>
+                <a:pPr lvl="1"/>
+                <a:r>
+                  <a:rPr lang="en-US" dirty="0" smtClean="0"/>
+                  <a:t>FLOPS: 1 add + 1 multiply = 1 FLOP</a:t>
+                </a:r>
+              </a:p>
+              <a:p>
+                <a:pPr lvl="1"/>
+                <a:r>
+                  <a:rPr lang="en-US" dirty="0" smtClean="0"/>
+                  <a:t>Data transfer: 2 loads + 1 store = 4 transfers</a:t>
+                </a:r>
+              </a:p>
+              <a:p>
+                <a:pPr lvl="1"/>
+                <a:r>
+                  <a:rPr lang="en-US" dirty="0" smtClean="0"/>
+                  <a:t>Code balance </a:t>
+                </a:r>
+                <a:r>
+                  <a:rPr lang="en-US" i="1" dirty="0" err="1" smtClean="0"/>
+                  <a:t>B</a:t>
+                </a:r>
+                <a:r>
+                  <a:rPr lang="en-US" i="1" baseline="-25000" dirty="0" err="1" smtClean="0"/>
+                  <a:t>c</a:t>
+                </a:r>
+                <a:r>
+                  <a:rPr lang="en-US" i="1" baseline="-25000" dirty="0" smtClean="0"/>
+                  <a:t> </a:t>
+                </a:r>
+                <a:r>
+                  <a:rPr lang="en-US" dirty="0" smtClean="0"/>
+                  <a:t> = 4 transfers/FLOP</a:t>
+                </a:r>
+              </a:p>
+              <a:p>
+                <a:r>
+                  <a:rPr lang="en-US" dirty="0" smtClean="0"/>
+                  <a:t>Light speed </a:t>
+                </a:r>
+                <a14:m>
+                  <m:oMath xmlns:m="http://schemas.openxmlformats.org/officeDocument/2006/math">
+                    <m:r>
+                      <a:rPr lang="en-US" i="1">
+                        <a:latin typeface="Cambria Math" panose="02040503050406030204" pitchFamily="18" charset="0"/>
+                        <a:ea typeface="Cambria Math" panose="02040503050406030204" pitchFamily="18" charset="0"/>
+                      </a:rPr>
+                      <m:t>ℓ </m:t>
+                    </m:r>
+                  </m:oMath>
+                </a14:m>
+                <a:r>
+                  <a:rPr lang="en-US" dirty="0" smtClean="0"/>
+                  <a:t>= 0.11</a:t>
+                </a:r>
+              </a:p>
+              <a:p>
+                <a:r>
+                  <a:rPr lang="en-US" dirty="0" smtClean="0"/>
+                  <a:t>Performance = 31 GFLOPS/s</a:t>
+                </a:r>
+              </a:p>
+              <a:p>
+                <a:endParaRPr lang="en-US" dirty="0"/>
+              </a:p>
+              <a:p>
+                <a:endParaRPr lang="en-US" dirty="0" smtClean="0"/>
+              </a:p>
+            </p:txBody>
+          </p:sp>
+        </mc:Choice>
+        <mc:Fallback>
+          <p:sp>
+            <p:nvSpPr>
+              <p:cNvPr id="3" name="Content Placeholder 2"/>
+              <p:cNvSpPr>
+                <a:spLocks noGrp="1" noRot="1" noChangeAspect="1" noMove="1" noResize="1" noEditPoints="1" noAdjustHandles="1" noChangeArrowheads="1" noChangeShapeType="1" noTextEdit="1"/>
+              </p:cNvSpPr>
+              <p:nvPr>
+                <p:ph idx="1"/>
+              </p:nvPr>
+            </p:nvSpPr>
+            <p:spPr>
+              <a:xfrm>
+                <a:off x="457200" y="1600200"/>
+                <a:ext cx="6660292" cy="4525963"/>
+              </a:xfrm>
+              <a:blipFill>
+                <a:blip r:embed="rId2"/>
+                <a:stretch>
+                  <a:fillRect l="-1281" t="-2561" b="-404"/>
+                </a:stretch>
+              </a:blipFill>
+            </p:spPr>
+            <p:txBody>
+              <a:bodyPr/>
+              <a:lstStyle/>
+              <a:p>
+                <a:r>
+                  <a:rPr lang="en-US">
+                    <a:noFill/>
+                  </a:rPr>
+                  <a:t> </a:t>
+                </a:r>
+              </a:p>
+            </p:txBody>
+          </p:sp>
+        </mc:Fallback>
+      </mc:AlternateContent>
+      <p:sp>
+        <p:nvSpPr>
+          <p:cNvPr id="4" name="Slide Number Placeholder 3"/>
+          <p:cNvSpPr>
+            <a:spLocks noGrp="1"/>
+          </p:cNvSpPr>
+          <p:nvPr>
+            <p:ph type="sldNum" sz="quarter" idx="12"/>
+          </p:nvPr>
+        </p:nvSpPr>
+        <p:spPr/>
+        <p:txBody>
+          <a:bodyPr/>
+          <a:lstStyle/>
+          <a:p>
+            <a:fld id="{6597116C-F94B-4B5B-973A-17F07FB5C418}" type="slidenum">
+              <a:rPr lang="nl-BE" smtClean="0"/>
+              <a:t>5</a:t>
+            </a:fld>
+            <a:endParaRPr lang="nl-BE"/>
+          </a:p>
+        </p:txBody>
+      </p:sp>
+      <p:sp>
+        <p:nvSpPr>
+          <p:cNvPr id="5" name="TextBox 4"/>
+          <p:cNvSpPr txBox="1"/>
+          <p:nvPr/>
+        </p:nvSpPr>
+        <p:spPr>
+          <a:xfrm>
+            <a:off x="5415325" y="4879022"/>
+            <a:ext cx="3631122" cy="1477328"/>
+          </a:xfrm>
+          <a:prstGeom prst="rect">
+            <a:avLst/>
+          </a:prstGeom>
+          <a:solidFill>
+            <a:schemeClr val="bg1">
+              <a:lumMod val="75000"/>
+            </a:schemeClr>
+          </a:solidFill>
+          <a:ln>
+            <a:solidFill>
+              <a:schemeClr val="tx1"/>
+            </a:solidFill>
+          </a:ln>
+        </p:spPr>
+        <p:txBody>
+          <a:bodyPr wrap="none" rtlCol="0">
+            <a:spAutoFit/>
+          </a:bodyPr>
+          <a:lstStyle/>
+          <a:p>
+            <a:r>
+              <a:rPr lang="en-US" dirty="0" smtClean="0">
+                <a:latin typeface="Courier New" panose="02070309020205020404" pitchFamily="49" charset="0"/>
+                <a:cs typeface="Courier New" panose="02070309020205020404" pitchFamily="49" charset="0"/>
+              </a:rPr>
+              <a:t>double </a:t>
+            </a:r>
+            <a:r>
+              <a:rPr lang="en-US" dirty="0" smtClean="0">
+                <a:latin typeface="Courier New" panose="02070309020205020404" pitchFamily="49" charset="0"/>
+                <a:cs typeface="Courier New" panose="02070309020205020404" pitchFamily="49" charset="0"/>
+              </a:rPr>
+              <a:t>a[n</a:t>
+            </a:r>
+            <a:r>
+              <a:rPr lang="en-US" dirty="0" smtClean="0">
+                <a:latin typeface="Courier New" panose="02070309020205020404" pitchFamily="49" charset="0"/>
+                <a:cs typeface="Courier New" panose="02070309020205020404" pitchFamily="49" charset="0"/>
+              </a:rPr>
+              <a:t>], b[n], c[n], </a:t>
+            </a:r>
+          </a:p>
+          <a:p>
+            <a:r>
+              <a:rPr lang="en-US" dirty="0">
+                <a:latin typeface="Courier New" panose="02070309020205020404" pitchFamily="49" charset="0"/>
+                <a:cs typeface="Courier New" panose="02070309020205020404" pitchFamily="49" charset="0"/>
+              </a:rPr>
+              <a:t> </a:t>
+            </a:r>
+            <a:r>
+              <a:rPr lang="en-US" dirty="0" smtClean="0">
+                <a:latin typeface="Courier New" panose="02070309020205020404" pitchFamily="49" charset="0"/>
+                <a:cs typeface="Courier New" panose="02070309020205020404" pitchFamily="49" charset="0"/>
+              </a:rPr>
+              <a:t>      </a:t>
+            </a:r>
+            <a:r>
+              <a:rPr lang="en-US" dirty="0" smtClean="0">
+                <a:latin typeface="Courier New" panose="02070309020205020404" pitchFamily="49" charset="0"/>
+                <a:cs typeface="Courier New" panose="02070309020205020404" pitchFamily="49" charset="0"/>
+              </a:rPr>
+              <a:t>s;</a:t>
+            </a:r>
+            <a:endParaRPr lang="en-US" dirty="0" smtClean="0">
+              <a:latin typeface="Courier New" panose="02070309020205020404" pitchFamily="49" charset="0"/>
+              <a:cs typeface="Courier New" panose="02070309020205020404" pitchFamily="49" charset="0"/>
+            </a:endParaRPr>
+          </a:p>
+          <a:p>
+            <a:r>
+              <a:rPr lang="en-US" dirty="0" smtClean="0">
+                <a:latin typeface="Courier New" panose="02070309020205020404" pitchFamily="49" charset="0"/>
+                <a:cs typeface="Courier New" panose="02070309020205020404" pitchFamily="49" charset="0"/>
+              </a:rPr>
+              <a:t>…</a:t>
+            </a:r>
+          </a:p>
+          <a:p>
+            <a:r>
+              <a:rPr lang="en-US" dirty="0" smtClean="0">
+                <a:latin typeface="Courier New" panose="02070309020205020404" pitchFamily="49" charset="0"/>
+                <a:cs typeface="Courier New" panose="02070309020205020404" pitchFamily="49" charset="0"/>
+              </a:rPr>
+              <a:t>for (</a:t>
+            </a:r>
+            <a:r>
+              <a:rPr lang="en-US" dirty="0" err="1" smtClean="0">
+                <a:latin typeface="Courier New" panose="02070309020205020404" pitchFamily="49" charset="0"/>
+                <a:cs typeface="Courier New" panose="02070309020205020404" pitchFamily="49" charset="0"/>
+              </a:rPr>
+              <a:t>i</a:t>
+            </a:r>
+            <a:r>
+              <a:rPr lang="en-US" dirty="0" smtClean="0">
+                <a:latin typeface="Courier New" panose="02070309020205020404" pitchFamily="49" charset="0"/>
+                <a:cs typeface="Courier New" panose="02070309020205020404" pitchFamily="49" charset="0"/>
+              </a:rPr>
+              <a:t> = 0; </a:t>
+            </a:r>
+            <a:r>
+              <a:rPr lang="en-US" dirty="0" err="1" smtClean="0">
+                <a:latin typeface="Courier New" panose="02070309020205020404" pitchFamily="49" charset="0"/>
+                <a:cs typeface="Courier New" panose="02070309020205020404" pitchFamily="49" charset="0"/>
+              </a:rPr>
+              <a:t>i</a:t>
+            </a:r>
+            <a:r>
+              <a:rPr lang="en-US" dirty="0">
+                <a:latin typeface="Courier New" panose="02070309020205020404" pitchFamily="49" charset="0"/>
+                <a:cs typeface="Courier New" panose="02070309020205020404" pitchFamily="49" charset="0"/>
+              </a:rPr>
+              <a:t> </a:t>
+            </a:r>
+            <a:r>
+              <a:rPr lang="en-US" dirty="0" smtClean="0">
+                <a:latin typeface="Courier New" panose="02070309020205020404" pitchFamily="49" charset="0"/>
+                <a:cs typeface="Courier New" panose="02070309020205020404" pitchFamily="49" charset="0"/>
+              </a:rPr>
+              <a:t>&lt; n; </a:t>
+            </a:r>
+            <a:r>
+              <a:rPr lang="en-US" dirty="0" err="1" smtClean="0">
+                <a:latin typeface="Courier New" panose="02070309020205020404" pitchFamily="49" charset="0"/>
+                <a:cs typeface="Courier New" panose="02070309020205020404" pitchFamily="49" charset="0"/>
+              </a:rPr>
+              <a:t>i</a:t>
+            </a:r>
+            <a:r>
+              <a:rPr lang="en-US" dirty="0">
+                <a:latin typeface="Courier New" panose="02070309020205020404" pitchFamily="49" charset="0"/>
+                <a:cs typeface="Courier New" panose="02070309020205020404" pitchFamily="49" charset="0"/>
+              </a:rPr>
+              <a:t>+</a:t>
+            </a:r>
+            <a:r>
+              <a:rPr lang="en-US" dirty="0" smtClean="0">
+                <a:latin typeface="Courier New" panose="02070309020205020404" pitchFamily="49" charset="0"/>
+                <a:cs typeface="Courier New" panose="02070309020205020404" pitchFamily="49" charset="0"/>
+              </a:rPr>
+              <a:t>+)</a:t>
+            </a:r>
+            <a:endParaRPr lang="en-US" dirty="0" smtClean="0">
+              <a:latin typeface="Courier New" panose="02070309020205020404" pitchFamily="49" charset="0"/>
+              <a:cs typeface="Courier New" panose="02070309020205020404" pitchFamily="49" charset="0"/>
+            </a:endParaRPr>
+          </a:p>
+          <a:p>
+            <a:r>
+              <a:rPr lang="en-US" dirty="0">
+                <a:latin typeface="Courier New" panose="02070309020205020404" pitchFamily="49" charset="0"/>
+                <a:cs typeface="Courier New" panose="02070309020205020404" pitchFamily="49" charset="0"/>
+              </a:rPr>
+              <a:t> </a:t>
+            </a:r>
+            <a:r>
+              <a:rPr lang="en-US" dirty="0" smtClean="0">
+                <a:latin typeface="Courier New" panose="02070309020205020404" pitchFamily="49" charset="0"/>
+                <a:cs typeface="Courier New" panose="02070309020205020404" pitchFamily="49" charset="0"/>
+              </a:rPr>
+              <a:t>   a[</a:t>
+            </a:r>
+            <a:r>
+              <a:rPr lang="en-US" dirty="0" err="1" smtClean="0">
+                <a:latin typeface="Courier New" panose="02070309020205020404" pitchFamily="49" charset="0"/>
+                <a:cs typeface="Courier New" panose="02070309020205020404" pitchFamily="49" charset="0"/>
+              </a:rPr>
+              <a:t>i</a:t>
+            </a:r>
+            <a:r>
+              <a:rPr lang="en-US" dirty="0" smtClean="0">
+                <a:latin typeface="Courier New" panose="02070309020205020404" pitchFamily="49" charset="0"/>
+                <a:cs typeface="Courier New" panose="02070309020205020404" pitchFamily="49" charset="0"/>
+              </a:rPr>
+              <a:t>] </a:t>
+            </a:r>
+            <a:r>
+              <a:rPr lang="en-US" dirty="0" smtClean="0">
+                <a:latin typeface="Courier New" panose="02070309020205020404" pitchFamily="49" charset="0"/>
+                <a:cs typeface="Courier New" panose="02070309020205020404" pitchFamily="49" charset="0"/>
+              </a:rPr>
+              <a:t>= b[</a:t>
+            </a:r>
+            <a:r>
+              <a:rPr lang="en-US" dirty="0" err="1" smtClean="0">
+                <a:latin typeface="Courier New" panose="02070309020205020404" pitchFamily="49" charset="0"/>
+                <a:cs typeface="Courier New" panose="02070309020205020404" pitchFamily="49" charset="0"/>
+              </a:rPr>
+              <a:t>i</a:t>
+            </a:r>
+            <a:r>
+              <a:rPr lang="en-US" dirty="0" smtClean="0">
+                <a:latin typeface="Courier New" panose="02070309020205020404" pitchFamily="49" charset="0"/>
+                <a:cs typeface="Courier New" panose="02070309020205020404" pitchFamily="49" charset="0"/>
+              </a:rPr>
+              <a:t>] + s*c[</a:t>
+            </a:r>
+            <a:r>
+              <a:rPr lang="en-US" dirty="0" err="1" smtClean="0">
+                <a:latin typeface="Courier New" panose="02070309020205020404" pitchFamily="49" charset="0"/>
+                <a:cs typeface="Courier New" panose="02070309020205020404" pitchFamily="49" charset="0"/>
+              </a:rPr>
+              <a:t>i</a:t>
+            </a:r>
+            <a:r>
+              <a:rPr lang="en-US" dirty="0" smtClean="0">
+                <a:latin typeface="Courier New" panose="02070309020205020404" pitchFamily="49" charset="0"/>
+                <a:cs typeface="Courier New" panose="02070309020205020404" pitchFamily="49" charset="0"/>
+              </a:rPr>
+              <a:t>];</a:t>
+            </a:r>
+            <a:endParaRPr lang="en-US" sz="1400" dirty="0" smtClean="0">
+              <a:latin typeface="Courier New" panose="02070309020205020404" pitchFamily="49" charset="0"/>
+              <a:cs typeface="Courier New" panose="02070309020205020404" pitchFamily="49" charset="0"/>
+            </a:endParaRPr>
+          </a:p>
+        </p:txBody>
+      </p:sp>
+    </p:spTree>
+    <p:extLst>
+      <p:ext uri="{BB962C8B-B14F-4D97-AF65-F5344CB8AC3E}">
+        <p14:creationId xmlns:p14="http://schemas.microsoft.com/office/powerpoint/2010/main" val="2142862529"/>
+      </p:ext>
+    </p:extLst>
+  </p:cSld>
+  <p:clrMapOvr>
+    <a:masterClrMapping/>
+  </p:clrMapOvr>
+  <p:timing>
+    <p:tnLst>
+      <p:par>
+        <p:cTn id="1" dur="indefinite" restart="never" nodeType="tmRoot">
+          <p:childTnLst>
+            <p:seq concurrent="1" nextAc="seek">
+              <p:cTn id="2" dur="indefinite" nodeType="mainSeq">
+                <p:childTnLst>
+                  <p:par>
+                    <p:cTn id="3" fill="hold">
+                      <p:stCondLst>
+                        <p:cond delay="indefinite"/>
+                        <p:cond evt="onBegin" delay="0">
+                          <p:tn val="2"/>
+                        </p:cond>
+                      </p:stCondLst>
+                      <p:childTnLst>
+                        <p:par>
+                          <p:cTn id="4" fill="hold">
+                            <p:stCondLst>
+                              <p:cond delay="0"/>
+                            </p:stCondLst>
+                            <p:childTnLst>
+                              <p:par>
+                                <p:cTn id="5" presetID="1" presetClass="entr" presetSubtype="0" fill="hold" grpId="0" nodeType="withEffect">
+                                  <p:stCondLst>
+                                    <p:cond delay="0"/>
+                                  </p:stCondLst>
+                                  <p:childTnLst>
+                                    <p:set>
+                                      <p:cBhvr>
+                                        <p:cTn id="6" dur="1" fill="hold">
+                                          <p:stCondLst>
+                                            <p:cond delay="0"/>
+                                          </p:stCondLst>
+                                        </p:cTn>
+                                        <p:tgtEl>
+                                          <p:spTgt spid="3">
+                                            <p:txEl>
+                                              <p:pRg st="0" end="0"/>
+                                            </p:txEl>
+                                          </p:spTgt>
+                                        </p:tgtEl>
+                                        <p:attrNameLst>
+                                          <p:attrName>style.visibility</p:attrName>
+                                        </p:attrNameLst>
+                                      </p:cBhvr>
+                                      <p:to>
+                                        <p:strVal val="visible"/>
+                                      </p:to>
+                                    </p:set>
+                                  </p:childTnLst>
+                                </p:cTn>
+                              </p:par>
+                            </p:childTnLst>
+                          </p:cTn>
+                        </p:par>
+                      </p:childTnLst>
+                    </p:cTn>
+                  </p:par>
+                  <p:par>
+                    <p:cTn id="7" fill="hold">
+                      <p:stCondLst>
+                        <p:cond delay="indefinite"/>
+                      </p:stCondLst>
+                      <p:childTnLst>
+                        <p:par>
+                          <p:cTn id="8" fill="hold">
+                            <p:stCondLst>
+                              <p:cond delay="0"/>
+                            </p:stCondLst>
+                            <p:childTnLst>
+                              <p:par>
+                                <p:cTn id="9" presetID="1" presetClass="entr" presetSubtype="0" fill="hold" grpId="0" nodeType="clickEffect">
+                                  <p:stCondLst>
+                                    <p:cond delay="0"/>
+                                  </p:stCondLst>
+                                  <p:childTnLst>
+                                    <p:set>
+                                      <p:cBhvr>
+                                        <p:cTn id="10" dur="1" fill="hold">
+                                          <p:stCondLst>
+                                            <p:cond delay="0"/>
+                                          </p:stCondLst>
+                                        </p:cTn>
+                                        <p:tgtEl>
+                                          <p:spTgt spid="3">
+                                            <p:txEl>
+                                              <p:pRg st="1" end="1"/>
+                                            </p:txEl>
+                                          </p:spTgt>
+                                        </p:tgtEl>
+                                        <p:attrNameLst>
+                                          <p:attrName>style.visibility</p:attrName>
+                                        </p:attrNameLst>
+                                      </p:cBhvr>
+                                      <p:to>
+                                        <p:strVal val="visible"/>
+                                      </p:to>
+                                    </p:set>
+                                  </p:childTnLst>
+                                </p:cTn>
+                              </p:par>
+                            </p:childTnLst>
+                          </p:cTn>
+                        </p:par>
+                      </p:childTnLst>
+                    </p:cTn>
+                  </p:par>
+                  <p:par>
+                    <p:cTn id="11" fill="hold">
+                      <p:stCondLst>
+                        <p:cond delay="indefinite"/>
+                      </p:stCondLst>
+                      <p:childTnLst>
+                        <p:par>
+                          <p:cTn id="12" fill="hold">
+                            <p:stCondLst>
+                              <p:cond delay="0"/>
+                            </p:stCondLst>
+                            <p:childTnLst>
+                              <p:par>
+                                <p:cTn id="13" presetID="1" presetClass="entr" presetSubtype="0" fill="hold" grpId="0" nodeType="clickEffect">
+                                  <p:stCondLst>
+                                    <p:cond delay="0"/>
+                                  </p:stCondLst>
+                                  <p:childTnLst>
+                                    <p:set>
+                                      <p:cBhvr>
+                                        <p:cTn id="14" dur="1" fill="hold">
+                                          <p:stCondLst>
+                                            <p:cond delay="0"/>
+                                          </p:stCondLst>
+                                        </p:cTn>
+                                        <p:tgtEl>
+                                          <p:spTgt spid="3">
+                                            <p:txEl>
+                                              <p:pRg st="2" end="2"/>
+                                            </p:txEl>
+                                          </p:spTgt>
+                                        </p:tgtEl>
+                                        <p:attrNameLst>
+                                          <p:attrName>style.visibility</p:attrName>
+                                        </p:attrNameLst>
+                                      </p:cBhvr>
+                                      <p:to>
+                                        <p:strVal val="visible"/>
+                                      </p:to>
+                                    </p:set>
+                                  </p:childTnLst>
+                                </p:cTn>
+                              </p:par>
+                            </p:childTnLst>
+                          </p:cTn>
+                        </p:par>
+                      </p:childTnLst>
+                    </p:cTn>
+                  </p:par>
+                  <p:par>
+                    <p:cTn id="15" fill="hold">
+                      <p:stCondLst>
+                        <p:cond delay="indefinite"/>
+                      </p:stCondLst>
+                      <p:childTnLst>
+                        <p:par>
+                          <p:cTn id="16" fill="hold">
+                            <p:stCondLst>
+                              <p:cond delay="0"/>
+                            </p:stCondLst>
+                            <p:childTnLst>
+                              <p:par>
+                                <p:cTn id="17" presetID="1" presetClass="entr" presetSubtype="0" fill="hold" grpId="0" nodeType="clickEffect">
+                                  <p:stCondLst>
+                                    <p:cond delay="0"/>
+                                  </p:stCondLst>
+                                  <p:childTnLst>
+                                    <p:set>
+                                      <p:cBhvr>
+                                        <p:cTn id="18" dur="1" fill="hold">
+                                          <p:stCondLst>
+                                            <p:cond delay="0"/>
+                                          </p:stCondLst>
+                                        </p:cTn>
+                                        <p:tgtEl>
+                                          <p:spTgt spid="3">
+                                            <p:txEl>
+                                              <p:pRg st="3" end="3"/>
+                                            </p:txEl>
+                                          </p:spTgt>
+                                        </p:tgtEl>
+                                        <p:attrNameLst>
+                                          <p:attrName>style.visibility</p:attrName>
+                                        </p:attrNameLst>
+                                      </p:cBhvr>
+                                      <p:to>
+                                        <p:strVal val="visible"/>
+                                      </p:to>
+                                    </p:set>
+                                  </p:childTnLst>
+                                </p:cTn>
+                              </p:par>
+                            </p:childTnLst>
+                          </p:cTn>
+                        </p:par>
+                      </p:childTnLst>
+                    </p:cTn>
+                  </p:par>
+                  <p:par>
+                    <p:cTn id="19" fill="hold">
+                      <p:stCondLst>
+                        <p:cond delay="indefinite"/>
+                      </p:stCondLst>
+                      <p:childTnLst>
+                        <p:par>
+                          <p:cTn id="20" fill="hold">
+                            <p:stCondLst>
+                              <p:cond delay="0"/>
+                            </p:stCondLst>
+                            <p:childTnLst>
+                              <p:par>
+                                <p:cTn id="21" presetID="1" presetClass="entr" presetSubtype="0" fill="hold" grpId="0" nodeType="clickEffect">
+                                  <p:stCondLst>
+                                    <p:cond delay="0"/>
+                                  </p:stCondLst>
+                                  <p:childTnLst>
+                                    <p:set>
+                                      <p:cBhvr>
+                                        <p:cTn id="22" dur="1" fill="hold">
+                                          <p:stCondLst>
+                                            <p:cond delay="0"/>
+                                          </p:stCondLst>
+                                        </p:cTn>
+                                        <p:tgtEl>
+                                          <p:spTgt spid="3">
+                                            <p:txEl>
+                                              <p:pRg st="4" end="4"/>
+                                            </p:txEl>
+                                          </p:spTgt>
+                                        </p:tgtEl>
+                                        <p:attrNameLst>
+                                          <p:attrName>style.visibility</p:attrName>
+                                        </p:attrNameLst>
+                                      </p:cBhvr>
+                                      <p:to>
+                                        <p:strVal val="visible"/>
+                                      </p:to>
+                                    </p:set>
+                                  </p:childTnLst>
+                                </p:cTn>
+                              </p:par>
+                              <p:par>
+                                <p:cTn id="23" presetID="1" presetClass="entr" presetSubtype="0" fill="hold" grpId="0" nodeType="withEffect">
+                                  <p:stCondLst>
+                                    <p:cond delay="0"/>
+                                  </p:stCondLst>
+                                  <p:childTnLst>
+                                    <p:set>
+                                      <p:cBhvr>
+                                        <p:cTn id="24" dur="1" fill="hold">
+                                          <p:stCondLst>
+                                            <p:cond delay="0"/>
+                                          </p:stCondLst>
+                                        </p:cTn>
+                                        <p:tgtEl>
+                                          <p:spTgt spid="5"/>
+                                        </p:tgtEl>
+                                        <p:attrNameLst>
+                                          <p:attrName>style.visibility</p:attrName>
+                                        </p:attrNameLst>
+                                      </p:cBhvr>
+                                      <p:to>
+                                        <p:strVal val="visible"/>
+                                      </p:to>
+                                    </p:set>
+                                  </p:childTnLst>
+                                </p:cTn>
+                              </p:par>
+                            </p:childTnLst>
+                          </p:cTn>
+                        </p:par>
+                      </p:childTnLst>
+                    </p:cTn>
+                  </p:par>
+                  <p:par>
+                    <p:cTn id="25" fill="hold">
+                      <p:stCondLst>
+                        <p:cond delay="indefinite"/>
+                      </p:stCondLst>
+                      <p:childTnLst>
+                        <p:par>
+                          <p:cTn id="26" fill="hold">
+                            <p:stCondLst>
+                              <p:cond delay="0"/>
+                            </p:stCondLst>
+                            <p:childTnLst>
+                              <p:par>
+                                <p:cTn id="27" presetID="1" presetClass="entr" presetSubtype="0" fill="hold" grpId="0" nodeType="clickEffect">
+                                  <p:stCondLst>
+                                    <p:cond delay="0"/>
+                                  </p:stCondLst>
+                                  <p:childTnLst>
+                                    <p:set>
+                                      <p:cBhvr>
+                                        <p:cTn id="28" dur="1" fill="hold">
+                                          <p:stCondLst>
+                                            <p:cond delay="0"/>
+                                          </p:stCondLst>
+                                        </p:cTn>
+                                        <p:tgtEl>
+                                          <p:spTgt spid="3">
+                                            <p:txEl>
+                                              <p:pRg st="5" end="5"/>
+                                            </p:txEl>
+                                          </p:spTgt>
+                                        </p:tgtEl>
+                                        <p:attrNameLst>
+                                          <p:attrName>style.visibility</p:attrName>
+                                        </p:attrNameLst>
+                                      </p:cBhvr>
+                                      <p:to>
+                                        <p:strVal val="visible"/>
+                                      </p:to>
+                                    </p:set>
+                                  </p:childTnLst>
+                                </p:cTn>
+                              </p:par>
+                            </p:childTnLst>
+                          </p:cTn>
+                        </p:par>
+                      </p:childTnLst>
+                    </p:cTn>
+                  </p:par>
+                  <p:par>
+                    <p:cTn id="29" fill="hold">
+                      <p:stCondLst>
+                        <p:cond delay="indefinite"/>
+                      </p:stCondLst>
+                      <p:childTnLst>
+                        <p:par>
+                          <p:cTn id="30" fill="hold">
+                            <p:stCondLst>
+                              <p:cond delay="0"/>
+                            </p:stCondLst>
+                            <p:childTnLst>
+                              <p:par>
+                                <p:cTn id="31" presetID="1" presetClass="entr" presetSubtype="0" fill="hold" grpId="0" nodeType="clickEffect">
+                                  <p:stCondLst>
+                                    <p:cond delay="0"/>
+                                  </p:stCondLst>
+                                  <p:childTnLst>
+                                    <p:set>
+                                      <p:cBhvr>
+                                        <p:cTn id="32" dur="1" fill="hold">
+                                          <p:stCondLst>
+                                            <p:cond delay="0"/>
+                                          </p:stCondLst>
+                                        </p:cTn>
+                                        <p:tgtEl>
+                                          <p:spTgt spid="3">
+                                            <p:txEl>
+                                              <p:pRg st="6" end="6"/>
+                                            </p:txEl>
+                                          </p:spTgt>
+                                        </p:tgtEl>
+                                        <p:attrNameLst>
+                                          <p:attrName>style.visibility</p:attrName>
+                                        </p:attrNameLst>
+                                      </p:cBhvr>
+                                      <p:to>
+                                        <p:strVal val="visible"/>
+                                      </p:to>
+                                    </p:set>
+                                  </p:childTnLst>
+                                </p:cTn>
+                              </p:par>
+                            </p:childTnLst>
+                          </p:cTn>
+                        </p:par>
+                      </p:childTnLst>
+                    </p:cTn>
+                  </p:par>
+                  <p:par>
+                    <p:cTn id="33" fill="hold">
+                      <p:stCondLst>
+                        <p:cond delay="indefinite"/>
+                      </p:stCondLst>
+                      <p:childTnLst>
+                        <p:par>
+                          <p:cTn id="34" fill="hold">
+                            <p:stCondLst>
+                              <p:cond delay="0"/>
+                            </p:stCondLst>
+                            <p:childTnLst>
+                              <p:par>
+                                <p:cTn id="35" presetID="1" presetClass="entr" presetSubtype="0" fill="hold" grpId="0" nodeType="clickEffect">
+                                  <p:stCondLst>
+                                    <p:cond delay="0"/>
+                                  </p:stCondLst>
+                                  <p:childTnLst>
+                                    <p:set>
+                                      <p:cBhvr>
+                                        <p:cTn id="36" dur="1" fill="hold">
+                                          <p:stCondLst>
+                                            <p:cond delay="0"/>
+                                          </p:stCondLst>
+                                        </p:cTn>
+                                        <p:tgtEl>
+                                          <p:spTgt spid="3">
+                                            <p:txEl>
+                                              <p:pRg st="7" end="7"/>
+                                            </p:txEl>
+                                          </p:spTgt>
+                                        </p:tgtEl>
+                                        <p:attrNameLst>
+                                          <p:attrName>style.visibility</p:attrName>
+                                        </p:attrNameLst>
+                                      </p:cBhvr>
+                                      <p:to>
+                                        <p:strVal val="visible"/>
+                                      </p:to>
+                                    </p:set>
+                                  </p:childTnLst>
+                                </p:cTn>
+                              </p:par>
+                            </p:childTnLst>
+                          </p:cTn>
+                        </p:par>
+                      </p:childTnLst>
+                    </p:cTn>
+                  </p:par>
+                  <p:par>
+                    <p:cTn id="37" fill="hold">
+                      <p:stCondLst>
+                        <p:cond delay="indefinite"/>
+                      </p:stCondLst>
+                      <p:childTnLst>
+                        <p:par>
+                          <p:cTn id="38" fill="hold">
+                            <p:stCondLst>
+                              <p:cond delay="0"/>
+                            </p:stCondLst>
+                            <p:childTnLst>
+                              <p:par>
+                                <p:cTn id="39" presetID="1" presetClass="entr" presetSubtype="0" fill="hold" grpId="0" nodeType="clickEffect">
+                                  <p:stCondLst>
+                                    <p:cond delay="0"/>
+                                  </p:stCondLst>
+                                  <p:childTnLst>
+                                    <p:set>
+                                      <p:cBhvr>
+                                        <p:cTn id="40" dur="1" fill="hold">
+                                          <p:stCondLst>
+                                            <p:cond delay="0"/>
+                                          </p:stCondLst>
+                                        </p:cTn>
+                                        <p:tgtEl>
+                                          <p:spTgt spid="3">
+                                            <p:txEl>
+                                              <p:pRg st="8" end="8"/>
+                                            </p:txEl>
+                                          </p:spTgt>
+                                        </p:tgtEl>
+                                        <p:attrNameLst>
+                                          <p:attrName>style.visibility</p:attrName>
+                                        </p:attrNameLst>
+                                      </p:cBhvr>
+                                      <p:to>
+                                        <p:strVal val="visible"/>
+                                      </p:to>
+                                    </p:set>
+                                  </p:childTnLst>
+                                </p:cTn>
+                              </p:par>
+                            </p:childTnLst>
+                          </p:cTn>
+                        </p:par>
+                      </p:childTnLst>
+                    </p:cTn>
+                  </p:par>
+                  <p:par>
+                    <p:cTn id="41" fill="hold">
+                      <p:stCondLst>
+                        <p:cond delay="indefinite"/>
+                      </p:stCondLst>
+                      <p:childTnLst>
+                        <p:par>
+                          <p:cTn id="42" fill="hold">
+                            <p:stCondLst>
+                              <p:cond delay="0"/>
+                            </p:stCondLst>
+                            <p:childTnLst>
+                              <p:par>
+                                <p:cTn id="43" presetID="1" presetClass="entr" presetSubtype="0" fill="hold" grpId="0" nodeType="clickEffect">
+                                  <p:stCondLst>
+                                    <p:cond delay="0"/>
+                                  </p:stCondLst>
+                                  <p:childTnLst>
+                                    <p:set>
+                                      <p:cBhvr>
+                                        <p:cTn id="44" dur="1" fill="hold">
+                                          <p:stCondLst>
+                                            <p:cond delay="0"/>
+                                          </p:stCondLst>
+                                        </p:cTn>
+                                        <p:tgtEl>
+                                          <p:spTgt spid="3">
+                                            <p:txEl>
+                                              <p:pRg st="9" end="9"/>
+                                            </p:txEl>
+                                          </p:spTgt>
+                                        </p:tgtEl>
+                                        <p:attrNameLst>
+                                          <p:attrName>style.visibility</p:attrName>
+                                        </p:attrNameLst>
+                                      </p:cBhvr>
+                                      <p:to>
+                                        <p:strVal val="visible"/>
+                                      </p:to>
+                                    </p:set>
+                                  </p:childTnLst>
+                                </p:cTn>
+                              </p:par>
+                            </p:childTnLst>
+                          </p:cTn>
+                        </p:par>
+                      </p:childTnLst>
+                    </p:cTn>
+                  </p:par>
+                </p:childTnLst>
+              </p:cTn>
+              <p:prevCondLst>
+                <p:cond evt="onPrev" delay="0">
+                  <p:tgtEl>
+                    <p:sldTgt/>
+                  </p:tgtEl>
+                </p:cond>
+              </p:prevCondLst>
+              <p:nextCondLst>
+                <p:cond evt="onNext" delay="0">
+                  <p:tgtEl>
+                    <p:sldTgt/>
+                  </p:tgtEl>
+                </p:cond>
+              </p:nextCondLst>
+            </p:seq>
+          </p:childTnLst>
+        </p:cTn>
+      </p:par>
+    </p:tnLst>
+    <p:bldLst>
+      <p:bldP spid="3" grpId="0" uiExpand="1" build="p"/>
+      <p:bldP spid="5" grpId="0" animBg="1"/>
+    </p:bldLst>
+  </p:timing>
+</p:sld>
+</file>
+
 <file path=ppt/theme/theme1.xml><?xml version="1.0" encoding="utf-8"?>
 <a:theme xmlns:a="http://schemas.openxmlformats.org/drawingml/2006/main" name="1_Office Theme">
   <a:themeElements>

</xml_diff>

<commit_message>
Reorder quantities and add example
</commit_message>
<xml_diff>
--- a/Optimization/performance_measures.pptx
+++ b/Optimization/performance_measures.pptx
@@ -297,7 +297,7 @@
           <a:p>
             <a:fld id="{1CFF3F78-F57F-4409-A41B-5EC46D4F404B}" type="datetime1">
               <a:rPr lang="nl-BE" smtClean="0"/>
-              <a:t>18/01/2018</a:t>
+              <a:t>19/01/2018</a:t>
             </a:fld>
             <a:endParaRPr lang="nl-BE"/>
           </a:p>
@@ -467,7 +467,7 @@
           <a:p>
             <a:fld id="{7D029E61-52E3-412C-82EB-2F81B17C0AF1}" type="datetime1">
               <a:rPr lang="nl-BE" smtClean="0"/>
-              <a:t>18/01/2018</a:t>
+              <a:t>19/01/2018</a:t>
             </a:fld>
             <a:endParaRPr lang="nl-BE"/>
           </a:p>
@@ -647,7 +647,7 @@
           <a:p>
             <a:fld id="{A83F1CEF-A38E-4001-89C6-F3FC7784F299}" type="datetime1">
               <a:rPr lang="nl-BE" smtClean="0"/>
-              <a:t>18/01/2018</a:t>
+              <a:t>19/01/2018</a:t>
             </a:fld>
             <a:endParaRPr lang="nl-BE"/>
           </a:p>
@@ -773,7 +773,7 @@
           <a:p>
             <a:fld id="{1FDE84DB-AADA-4C3F-BF46-CA664A504479}" type="datetime1">
               <a:rPr lang="nl-BE" smtClean="0"/>
-              <a:t>18/01/2018</a:t>
+              <a:t>19/01/2018</a:t>
             </a:fld>
             <a:endParaRPr lang="nl-BE" dirty="0"/>
           </a:p>
@@ -1017,7 +1017,7 @@
           <a:p>
             <a:fld id="{8CD53A43-C15C-4F05-9AD7-DB9DE837084D}" type="datetime1">
               <a:rPr lang="nl-BE" smtClean="0"/>
-              <a:t>18/01/2018</a:t>
+              <a:t>19/01/2018</a:t>
             </a:fld>
             <a:endParaRPr lang="nl-BE"/>
           </a:p>
@@ -1263,7 +1263,7 @@
           <a:p>
             <a:fld id="{8994D238-D949-4AEF-9753-A8B6EFA964A0}" type="datetime1">
               <a:rPr lang="nl-BE" smtClean="0"/>
-              <a:t>18/01/2018</a:t>
+              <a:t>19/01/2018</a:t>
             </a:fld>
             <a:endParaRPr lang="nl-BE"/>
           </a:p>
@@ -1551,7 +1551,7 @@
           <a:p>
             <a:fld id="{4D234023-BF99-4AD0-835E-8125DA2B6664}" type="datetime1">
               <a:rPr lang="nl-BE" smtClean="0"/>
-              <a:t>18/01/2018</a:t>
+              <a:t>19/01/2018</a:t>
             </a:fld>
             <a:endParaRPr lang="nl-BE"/>
           </a:p>
@@ -1973,7 +1973,7 @@
           <a:p>
             <a:fld id="{DB075A73-5C1D-406E-9444-3C5C58580E8E}" type="datetime1">
               <a:rPr lang="nl-BE" smtClean="0"/>
-              <a:t>18/01/2018</a:t>
+              <a:t>19/01/2018</a:t>
             </a:fld>
             <a:endParaRPr lang="nl-BE"/>
           </a:p>
@@ -2091,7 +2091,7 @@
           <a:p>
             <a:fld id="{E111FB2D-2E17-4D8F-A64A-4EB0C3D12494}" type="datetime1">
               <a:rPr lang="nl-BE" smtClean="0"/>
-              <a:t>18/01/2018</a:t>
+              <a:t>19/01/2018</a:t>
             </a:fld>
             <a:endParaRPr lang="nl-BE"/>
           </a:p>
@@ -2186,7 +2186,7 @@
           <a:p>
             <a:fld id="{5BE27D71-2267-4E44-9F33-05B60E5C7D9D}" type="datetime1">
               <a:rPr lang="nl-BE" smtClean="0"/>
-              <a:t>18/01/2018</a:t>
+              <a:t>19/01/2018</a:t>
             </a:fld>
             <a:endParaRPr lang="nl-BE"/>
           </a:p>
@@ -2463,7 +2463,7 @@
           <a:p>
             <a:fld id="{182F587C-96C8-4813-A767-3084061A3229}" type="datetime1">
               <a:rPr lang="nl-BE" smtClean="0"/>
-              <a:t>18/01/2018</a:t>
+              <a:t>19/01/2018</a:t>
             </a:fld>
             <a:endParaRPr lang="nl-BE"/>
           </a:p>
@@ -2716,7 +2716,7 @@
           <a:p>
             <a:fld id="{8B021CF8-BBBB-4DFA-8713-49842AA07274}" type="datetime1">
               <a:rPr lang="nl-BE" smtClean="0"/>
-              <a:t>18/01/2018</a:t>
+              <a:t>19/01/2018</a:t>
             </a:fld>
             <a:endParaRPr lang="nl-BE"/>
           </a:p>
@@ -2929,7 +2929,7 @@
           <a:p>
             <a:fld id="{CDBFABB5-0AB3-4CB6-A705-6887DEB1F9F2}" type="datetime1">
               <a:rPr lang="nl-BE" smtClean="0"/>
-              <a:t>18/01/2018</a:t>
+              <a:t>19/01/2018</a:t>
             </a:fld>
             <a:endParaRPr lang="nl-BE"/>
           </a:p>
@@ -3516,9 +3516,42 @@
           <a:lstStyle/>
           <a:p>
             <a:r>
+              <a:rPr lang="nl-BE" dirty="0"/>
+              <a:t>Memory access</a:t>
+            </a:r>
+          </a:p>
+          <a:p>
+            <a:pPr lvl="1"/>
+            <a:r>
+              <a:rPr lang="nl-BE" dirty="0"/>
+              <a:t>bandwidth</a:t>
+            </a:r>
+          </a:p>
+          <a:p>
+            <a:pPr lvl="1"/>
+            <a:r>
+              <a:rPr lang="nl-BE" dirty="0"/>
+              <a:t>Gwords/s </a:t>
+            </a:r>
+            <a:r>
+              <a:rPr lang="nl-BE" dirty="0" smtClean="0"/>
+              <a:t>(double precision gigawords </a:t>
+            </a:r>
+            <a:r>
+              <a:rPr lang="nl-BE" dirty="0"/>
+              <a:t>per </a:t>
+            </a:r>
+            <a:r>
+              <a:rPr lang="nl-BE" dirty="0" smtClean="0"/>
+              <a:t>second)</a:t>
+            </a:r>
+          </a:p>
+          <a:p>
+            <a:r>
               <a:rPr lang="nl-BE" dirty="0" smtClean="0"/>
               <a:t>Computation</a:t>
             </a:r>
+            <a:endParaRPr lang="nl-BE" dirty="0" smtClean="0"/>
           </a:p>
           <a:p>
             <a:pPr lvl="1"/>
@@ -3535,36 +3568,13 @@
             </a:r>
             <a:r>
               <a:rPr lang="nl-BE" dirty="0" smtClean="0"/>
-              <a:t>ouble precision FLOPS/s (FLOating point OPerationS per second)</a:t>
-            </a:r>
-          </a:p>
-          <a:p>
-            <a:r>
-              <a:rPr lang="nl-BE" dirty="0"/>
-              <a:t>Memory </a:t>
+              <a:t>ouble precision FLOPS/s (FLOating point OPerationS per second</a:t>
             </a:r>
             <a:r>
               <a:rPr lang="nl-BE" dirty="0" smtClean="0"/>
-              <a:t>access</a:t>
-            </a:r>
-          </a:p>
-          <a:p>
-            <a:pPr lvl="1"/>
-            <a:r>
-              <a:rPr lang="nl-BE" dirty="0"/>
-              <a:t>b</a:t>
-            </a:r>
-            <a:r>
-              <a:rPr lang="nl-BE" dirty="0" smtClean="0"/>
-              <a:t>andwidth</a:t>
-            </a:r>
-          </a:p>
-          <a:p>
-            <a:pPr lvl="1"/>
-            <a:r>
-              <a:rPr lang="nl-BE" dirty="0" smtClean="0"/>
-              <a:t>Gwords/s per gigawords per second</a:t>
-            </a:r>
+              <a:t>)</a:t>
+            </a:r>
+            <a:endParaRPr lang="nl-BE" dirty="0" smtClean="0"/>
           </a:p>
           <a:p>
             <a:r>
@@ -4247,9 +4257,23 @@
           <a:lstStyle/>
           <a:p>
             <a:r>
+              <a:rPr lang="en-US" dirty="0"/>
+              <a:t>Memory access</a:t>
+            </a:r>
+          </a:p>
+          <a:p>
+            <a:pPr lvl="1"/>
+            <a:r>
+              <a:rPr lang="en-US" dirty="0"/>
+              <a:t>number of word load and store operations</a:t>
+            </a:r>
+          </a:p>
+          <a:p>
+            <a:r>
               <a:rPr lang="en-US" dirty="0" smtClean="0"/>
               <a:t>Computation</a:t>
             </a:r>
+            <a:endParaRPr lang="en-US" dirty="0" smtClean="0"/>
           </a:p>
           <a:p>
             <a:pPr lvl="1"/>
@@ -4261,24 +4285,11 @@
           <a:p>
             <a:r>
               <a:rPr lang="en-US" dirty="0" smtClean="0"/>
-              <a:t>Memory access</a:t>
-            </a:r>
-          </a:p>
-          <a:p>
-            <a:pPr lvl="1"/>
-            <a:r>
-              <a:rPr lang="en-US" dirty="0"/>
-              <a:t>n</a:t>
+              <a:t>Code </a:t>
             </a:r>
             <a:r>
               <a:rPr lang="en-US" dirty="0" smtClean="0"/>
-              <a:t>umber of word load and store operations</a:t>
-            </a:r>
-          </a:p>
-          <a:p>
-            <a:r>
-              <a:rPr lang="en-US" dirty="0" smtClean="0"/>
-              <a:t>Code balance</a:t>
+              <a:t>balance</a:t>
             </a:r>
           </a:p>
           <a:p>
@@ -5816,13 +5827,13 @@
             </p:nvSpPr>
             <p:spPr>
               <a:xfrm>
-                <a:off x="457200" y="1600200"/>
+                <a:off x="457200" y="1605649"/>
                 <a:ext cx="6660292" cy="4525963"/>
               </a:xfrm>
             </p:spPr>
             <p:txBody>
               <a:bodyPr>
-                <a:normAutofit fontScale="77500" lnSpcReduction="20000"/>
+                <a:normAutofit fontScale="70000" lnSpcReduction="20000"/>
               </a:bodyPr>
               <a:lstStyle/>
               <a:p>
@@ -5854,8 +5865,38 @@
               <a:p>
                 <a:pPr lvl="1"/>
                 <a:r>
+                  <a:rPr lang="en-US" dirty="0"/>
+                  <a:t>memory bandwidth: 125 GB/s = 15.6 </a:t>
+                </a:r>
+                <a:r>
+                  <a:rPr lang="en-US" dirty="0" err="1" smtClean="0"/>
+                  <a:t>Gword</a:t>
+                </a:r>
+                <a:r>
                   <a:rPr lang="en-US" dirty="0" smtClean="0"/>
-                  <a:t>peak performance:</a:t>
+                  <a:t>/s</a:t>
+                </a:r>
+                <a:br>
+                  <a:rPr lang="en-US" dirty="0" smtClean="0"/>
+                </a:br>
+                <a:r>
+                  <a:rPr lang="en-US" dirty="0" smtClean="0"/>
+                  <a:t>(vector </a:t>
+                </a:r>
+                <a:r>
+                  <a:rPr lang="en-US" dirty="0"/>
+                  <a:t>triad access, double precision)</a:t>
+                </a:r>
+              </a:p>
+              <a:p>
+                <a:pPr lvl="1"/>
+                <a:r>
+                  <a:rPr lang="en-US" dirty="0" smtClean="0"/>
+                  <a:t>peak </a:t>
+                </a:r>
+                <a:r>
+                  <a:rPr lang="en-US" dirty="0" smtClean="0"/>
+                  <a:t>performance:</a:t>
                 </a:r>
                 <a:br>
                   <a:rPr lang="en-US" dirty="0" smtClean="0"/>
@@ -5915,19 +5956,12 @@
               <a:p>
                 <a:pPr lvl="1"/>
                 <a:r>
-                  <a:rPr lang="en-US" dirty="0"/>
-                  <a:t>m</a:t>
+                  <a:rPr lang="en-US" dirty="0" smtClean="0"/>
+                  <a:t>Machine </a:t>
                 </a:r>
                 <a:r>
                   <a:rPr lang="en-US" dirty="0" smtClean="0"/>
-                  <a:t>emory bandwidth: 125 GB/s (vector triad)</a:t>
-                </a:r>
-              </a:p>
-              <a:p>
-                <a:pPr lvl="1"/>
-                <a:r>
-                  <a:rPr lang="en-US" dirty="0" smtClean="0"/>
-                  <a:t>Machine balance </a:t>
+                  <a:t>balance </a:t>
                 </a:r>
                 <a:r>
                   <a:rPr lang="en-US" i="1" dirty="0" err="1" smtClean="0"/>
@@ -5939,34 +5973,64 @@
                 </a:r>
                 <a:r>
                   <a:rPr lang="en-US" dirty="0" smtClean="0"/>
-                  <a:t> = 0.46 bytes/FLOP</a:t>
+                  <a:t> = </a:t>
                 </a:r>
+                <a:r>
+                  <a:rPr lang="en-US" dirty="0" smtClean="0"/>
+                  <a:t>0.058 words/FLOP</a:t>
+                </a:r>
+                <a:endParaRPr lang="en-US" dirty="0" smtClean="0"/>
               </a:p>
               <a:p>
                 <a:r>
                   <a:rPr lang="en-US" dirty="0" smtClean="0"/>
-                  <a:t>Code balance for vector triad</a:t>
+                  <a:t>Code balance </a:t>
+                </a:r>
+                <a:r>
+                  <a:rPr lang="en-US" dirty="0" smtClean="0"/>
+                  <a:t>for double precision </a:t>
+                </a:r>
+                <a:r>
+                  <a:rPr lang="en-US" dirty="0" smtClean="0"/>
+                  <a:t>vector triad</a:t>
+                </a:r>
+              </a:p>
+              <a:p>
+                <a:pPr lvl="1"/>
+                <a:r>
+                  <a:rPr lang="en-US" dirty="0"/>
+                  <a:t>data transfer: 2 loads + 1 store = 4 </a:t>
+                </a:r>
+                <a:r>
+                  <a:rPr lang="en-US" dirty="0" smtClean="0"/>
+                  <a:t>word transfers</a:t>
+                </a:r>
+                <a:endParaRPr lang="en-US" dirty="0"/>
+              </a:p>
+              <a:p>
+                <a:pPr lvl="1"/>
+                <a:r>
+                  <a:rPr lang="en-US" dirty="0" smtClean="0"/>
+                  <a:t>FLOPS</a:t>
+                </a:r>
+                <a:r>
+                  <a:rPr lang="en-US" dirty="0" smtClean="0"/>
+                  <a:t>: 1 add + 1 multiply = 1 FLOP</a:t>
                 </a:r>
               </a:p>
               <a:p>
                 <a:pPr lvl="1"/>
                 <a:r>
                   <a:rPr lang="en-US" dirty="0" smtClean="0"/>
-                  <a:t>FLOPS: 1 add + 1 multiply = 1 FLOP</a:t>
+                  <a:t>c</a:t>
                 </a:r>
-              </a:p>
-              <a:p>
-                <a:pPr lvl="1"/>
                 <a:r>
                   <a:rPr lang="en-US" dirty="0" smtClean="0"/>
-                  <a:t>Data transfer: 2 loads + 1 store = 4 transfers</a:t>
+                  <a:t>ode </a:t>
                 </a:r>
-              </a:p>
-              <a:p>
-                <a:pPr lvl="1"/>
                 <a:r>
                   <a:rPr lang="en-US" dirty="0" smtClean="0"/>
-                  <a:t>Code balance </a:t>
+                  <a:t>balance </a:t>
                 </a:r>
                 <a:r>
                   <a:rPr lang="en-US" i="1" dirty="0" err="1" smtClean="0"/>
@@ -6003,13 +6067,26 @@
                 </a14:m>
                 <a:r>
                   <a:rPr lang="en-US" dirty="0" smtClean="0"/>
-                  <a:t>= 0.11</a:t>
+                  <a:t>= </a:t>
                 </a:r>
+                <a:r>
+                  <a:rPr lang="en-US" dirty="0" smtClean="0"/>
+                  <a:t>0.015</a:t>
+                </a:r>
+                <a:endParaRPr lang="en-US" dirty="0" smtClean="0"/>
               </a:p>
               <a:p>
                 <a:r>
                   <a:rPr lang="en-US" dirty="0" smtClean="0"/>
-                  <a:t>Performance = 31 GFLOPS/s</a:t>
+                  <a:t>Performance = </a:t>
+                </a:r>
+                <a:r>
+                  <a:rPr lang="en-US" dirty="0" smtClean="0"/>
+                  <a:t>3.9 </a:t>
+                </a:r>
+                <a:r>
+                  <a:rPr lang="en-US" dirty="0" smtClean="0"/>
+                  <a:t>GFLOPS/s</a:t>
                 </a:r>
               </a:p>
               <a:p>
@@ -6034,13 +6111,13 @@
             </p:nvSpPr>
             <p:spPr>
               <a:xfrm>
-                <a:off x="457200" y="1600200"/>
+                <a:off x="457200" y="1605649"/>
                 <a:ext cx="6660292" cy="4525963"/>
               </a:xfrm>
               <a:blipFill>
                 <a:blip r:embed="rId2"/>
                 <a:stretch>
-                  <a:fillRect l="-1281" t="-2561" b="-404"/>
+                  <a:fillRect l="-1006" t="-2153"/>
                 </a:stretch>
               </a:blipFill>
             </p:spPr>
@@ -6090,8 +6167,8 @@
         </p:nvSpPr>
         <p:spPr>
           <a:xfrm>
-            <a:off x="5415325" y="4879022"/>
-            <a:ext cx="3631122" cy="1477328"/>
+            <a:off x="5164072" y="4656601"/>
+            <a:ext cx="3906839" cy="1200329"/>
           </a:xfrm>
           <a:prstGeom prst="rect">
             <a:avLst/>
@@ -6118,24 +6195,61 @@
                 <a:latin typeface="Courier New" panose="02070309020205020404" pitchFamily="49" charset="0"/>
                 <a:cs typeface="Courier New" panose="02070309020205020404" pitchFamily="49" charset="0"/>
               </a:rPr>
-              <a:t>double </a:t>
+              <a:t>double a[n], b[n], c[n</a:t>
             </a:r>
             <a:r>
               <a:rPr lang="en-US" dirty="0" smtClean="0">
                 <a:latin typeface="Courier New" panose="02070309020205020404" pitchFamily="49" charset="0"/>
                 <a:cs typeface="Courier New" panose="02070309020205020404" pitchFamily="49" charset="0"/>
               </a:rPr>
-              <a:t>a[n</a:t>
+              <a:t>], </a:t>
             </a:r>
             <a:r>
               <a:rPr lang="en-US" dirty="0" smtClean="0">
                 <a:latin typeface="Courier New" panose="02070309020205020404" pitchFamily="49" charset="0"/>
                 <a:cs typeface="Courier New" panose="02070309020205020404" pitchFamily="49" charset="0"/>
               </a:rPr>
-              <a:t>], b[n], c[n], </a:t>
-            </a:r>
-          </a:p>
-          <a:p>
+              <a:t>s;</a:t>
+            </a:r>
+          </a:p>
+          <a:p>
+            <a:r>
+              <a:rPr lang="en-US" dirty="0" smtClean="0">
+                <a:latin typeface="Courier New" panose="02070309020205020404" pitchFamily="49" charset="0"/>
+                <a:cs typeface="Courier New" panose="02070309020205020404" pitchFamily="49" charset="0"/>
+              </a:rPr>
+              <a:t>…</a:t>
+            </a:r>
+          </a:p>
+          <a:p>
+            <a:r>
+              <a:rPr lang="en-US" dirty="0" smtClean="0">
+                <a:latin typeface="Courier New" panose="02070309020205020404" pitchFamily="49" charset="0"/>
+                <a:cs typeface="Courier New" panose="02070309020205020404" pitchFamily="49" charset="0"/>
+              </a:rPr>
+              <a:t>for (</a:t>
+            </a:r>
+            <a:r>
+              <a:rPr lang="en-US" dirty="0" err="1" smtClean="0">
+                <a:latin typeface="Courier New" panose="02070309020205020404" pitchFamily="49" charset="0"/>
+                <a:cs typeface="Courier New" panose="02070309020205020404" pitchFamily="49" charset="0"/>
+              </a:rPr>
+              <a:t>i</a:t>
+            </a:r>
+            <a:r>
+              <a:rPr lang="en-US" dirty="0" smtClean="0">
+                <a:latin typeface="Courier New" panose="02070309020205020404" pitchFamily="49" charset="0"/>
+                <a:cs typeface="Courier New" panose="02070309020205020404" pitchFamily="49" charset="0"/>
+              </a:rPr>
+              <a:t> = 0; </a:t>
+            </a:r>
+            <a:r>
+              <a:rPr lang="en-US" dirty="0" err="1" smtClean="0">
+                <a:latin typeface="Courier New" panose="02070309020205020404" pitchFamily="49" charset="0"/>
+                <a:cs typeface="Courier New" panose="02070309020205020404" pitchFamily="49" charset="0"/>
+              </a:rPr>
+              <a:t>i</a:t>
+            </a:r>
             <a:r>
               <a:rPr lang="en-US" dirty="0">
                 <a:latin typeface="Courier New" panose="02070309020205020404" pitchFamily="49" charset="0"/>
@@ -6148,36 +6262,7 @@
                 <a:latin typeface="Courier New" panose="02070309020205020404" pitchFamily="49" charset="0"/>
                 <a:cs typeface="Courier New" panose="02070309020205020404" pitchFamily="49" charset="0"/>
               </a:rPr>
-              <a:t>      </a:t>
-            </a:r>
-            <a:r>
-              <a:rPr lang="en-US" dirty="0" smtClean="0">
-                <a:latin typeface="Courier New" panose="02070309020205020404" pitchFamily="49" charset="0"/>
-                <a:cs typeface="Courier New" panose="02070309020205020404" pitchFamily="49" charset="0"/>
-              </a:rPr>
-              <a:t>s;</a:t>
-            </a:r>
-            <a:endParaRPr lang="en-US" dirty="0" smtClean="0">
-              <a:latin typeface="Courier New" panose="02070309020205020404" pitchFamily="49" charset="0"/>
-              <a:cs typeface="Courier New" panose="02070309020205020404" pitchFamily="49" charset="0"/>
-            </a:endParaRPr>
-          </a:p>
-          <a:p>
-            <a:r>
-              <a:rPr lang="en-US" dirty="0" smtClean="0">
-                <a:latin typeface="Courier New" panose="02070309020205020404" pitchFamily="49" charset="0"/>
-                <a:cs typeface="Courier New" panose="02070309020205020404" pitchFamily="49" charset="0"/>
-              </a:rPr>
-              <a:t>…</a:t>
-            </a:r>
-          </a:p>
-          <a:p>
-            <a:r>
-              <a:rPr lang="en-US" dirty="0" smtClean="0">
-                <a:latin typeface="Courier New" panose="02070309020205020404" pitchFamily="49" charset="0"/>
-                <a:cs typeface="Courier New" panose="02070309020205020404" pitchFamily="49" charset="0"/>
-              </a:rPr>
-              <a:t>for (</a:t>
+              <a:t>&lt; n; </a:t>
             </a:r>
             <a:r>
               <a:rPr lang="en-US" dirty="0" err="1" smtClean="0">
@@ -6187,11 +6272,34 @@
               <a:t>i</a:t>
             </a:r>
             <a:r>
+              <a:rPr lang="en-US" dirty="0">
+                <a:latin typeface="Courier New" panose="02070309020205020404" pitchFamily="49" charset="0"/>
+                <a:cs typeface="Courier New" panose="02070309020205020404" pitchFamily="49" charset="0"/>
+              </a:rPr>
+              <a:t>+</a:t>
+            </a:r>
+            <a:r>
               <a:rPr lang="en-US" dirty="0" smtClean="0">
                 <a:latin typeface="Courier New" panose="02070309020205020404" pitchFamily="49" charset="0"/>
                 <a:cs typeface="Courier New" panose="02070309020205020404" pitchFamily="49" charset="0"/>
               </a:rPr>
-              <a:t> = 0; </a:t>
+              <a:t>+)</a:t>
+            </a:r>
+          </a:p>
+          <a:p>
+            <a:r>
+              <a:rPr lang="en-US" dirty="0">
+                <a:latin typeface="Courier New" panose="02070309020205020404" pitchFamily="49" charset="0"/>
+                <a:cs typeface="Courier New" panose="02070309020205020404" pitchFamily="49" charset="0"/>
+              </a:rPr>
+              <a:t> </a:t>
+            </a:r>
+            <a:r>
+              <a:rPr lang="en-US" dirty="0" smtClean="0">
+                <a:latin typeface="Courier New" panose="02070309020205020404" pitchFamily="49" charset="0"/>
+                <a:cs typeface="Courier New" panose="02070309020205020404" pitchFamily="49" charset="0"/>
+              </a:rPr>
+              <a:t>   a[</a:t>
             </a:r>
             <a:r>
               <a:rPr lang="en-US" dirty="0" err="1" smtClean="0">
@@ -6201,18 +6309,11 @@
               <a:t>i</a:t>
             </a:r>
             <a:r>
-              <a:rPr lang="en-US" dirty="0">
-                <a:latin typeface="Courier New" panose="02070309020205020404" pitchFamily="49" charset="0"/>
-                <a:cs typeface="Courier New" panose="02070309020205020404" pitchFamily="49" charset="0"/>
-              </a:rPr>
-              <a:t> </a:t>
-            </a:r>
-            <a:r>
               <a:rPr lang="en-US" dirty="0" smtClean="0">
                 <a:latin typeface="Courier New" panose="02070309020205020404" pitchFamily="49" charset="0"/>
                 <a:cs typeface="Courier New" panose="02070309020205020404" pitchFamily="49" charset="0"/>
               </a:rPr>
-              <a:t>&lt; n; </a:t>
+              <a:t>] = b[</a:t>
             </a:r>
             <a:r>
               <a:rPr lang="en-US" dirty="0" err="1" smtClean="0">
@@ -6222,38 +6323,11 @@
               <a:t>i</a:t>
             </a:r>
             <a:r>
-              <a:rPr lang="en-US" dirty="0">
-                <a:latin typeface="Courier New" panose="02070309020205020404" pitchFamily="49" charset="0"/>
-                <a:cs typeface="Courier New" panose="02070309020205020404" pitchFamily="49" charset="0"/>
-              </a:rPr>
-              <a:t>+</a:t>
-            </a:r>
-            <a:r>
               <a:rPr lang="en-US" dirty="0" smtClean="0">
                 <a:latin typeface="Courier New" panose="02070309020205020404" pitchFamily="49" charset="0"/>
                 <a:cs typeface="Courier New" panose="02070309020205020404" pitchFamily="49" charset="0"/>
               </a:rPr>
-              <a:t>+)</a:t>
-            </a:r>
-            <a:endParaRPr lang="en-US" dirty="0" smtClean="0">
-              <a:latin typeface="Courier New" panose="02070309020205020404" pitchFamily="49" charset="0"/>
-              <a:cs typeface="Courier New" panose="02070309020205020404" pitchFamily="49" charset="0"/>
-            </a:endParaRPr>
-          </a:p>
-          <a:p>
-            <a:r>
-              <a:rPr lang="en-US" dirty="0">
-                <a:latin typeface="Courier New" panose="02070309020205020404" pitchFamily="49" charset="0"/>
-                <a:cs typeface="Courier New" panose="02070309020205020404" pitchFamily="49" charset="0"/>
-              </a:rPr>
-              <a:t> </a:t>
-            </a:r>
-            <a:r>
-              <a:rPr lang="en-US" dirty="0" smtClean="0">
-                <a:latin typeface="Courier New" panose="02070309020205020404" pitchFamily="49" charset="0"/>
-                <a:cs typeface="Courier New" panose="02070309020205020404" pitchFamily="49" charset="0"/>
-              </a:rPr>
-              <a:t>   a[</a:t>
+              <a:t>] + s*c[</a:t>
             </a:r>
             <a:r>
               <a:rPr lang="en-US" dirty="0" err="1" smtClean="0">
@@ -6267,41 +6341,6 @@
                 <a:latin typeface="Courier New" panose="02070309020205020404" pitchFamily="49" charset="0"/>
                 <a:cs typeface="Courier New" panose="02070309020205020404" pitchFamily="49" charset="0"/>
               </a:rPr>
-              <a:t>] </a:t>
-            </a:r>
-            <a:r>
-              <a:rPr lang="en-US" dirty="0" smtClean="0">
-                <a:latin typeface="Courier New" panose="02070309020205020404" pitchFamily="49" charset="0"/>
-                <a:cs typeface="Courier New" panose="02070309020205020404" pitchFamily="49" charset="0"/>
-              </a:rPr>
-              <a:t>= b[</a:t>
-            </a:r>
-            <a:r>
-              <a:rPr lang="en-US" dirty="0" err="1" smtClean="0">
-                <a:latin typeface="Courier New" panose="02070309020205020404" pitchFamily="49" charset="0"/>
-                <a:cs typeface="Courier New" panose="02070309020205020404" pitchFamily="49" charset="0"/>
-              </a:rPr>
-              <a:t>i</a:t>
-            </a:r>
-            <a:r>
-              <a:rPr lang="en-US" dirty="0" smtClean="0">
-                <a:latin typeface="Courier New" panose="02070309020205020404" pitchFamily="49" charset="0"/>
-                <a:cs typeface="Courier New" panose="02070309020205020404" pitchFamily="49" charset="0"/>
-              </a:rPr>
-              <a:t>] + s*c[</a:t>
-            </a:r>
-            <a:r>
-              <a:rPr lang="en-US" dirty="0" err="1" smtClean="0">
-                <a:latin typeface="Courier New" panose="02070309020205020404" pitchFamily="49" charset="0"/>
-                <a:cs typeface="Courier New" panose="02070309020205020404" pitchFamily="49" charset="0"/>
-              </a:rPr>
-              <a:t>i</a:t>
-            </a:r>
-            <a:r>
-              <a:rPr lang="en-US" dirty="0" smtClean="0">
-                <a:latin typeface="Courier New" panose="02070309020205020404" pitchFamily="49" charset="0"/>
-                <a:cs typeface="Courier New" panose="02070309020205020404" pitchFamily="49" charset="0"/>
-              </a:rPr>
               <a:t>];</a:t>
             </a:r>
             <a:endParaRPr lang="en-US" sz="1400" dirty="0" smtClean="0">
@@ -6311,6 +6350,645 @@
           </a:p>
         </p:txBody>
       </p:sp>
+      <mc:AlternateContent xmlns:mc="http://schemas.openxmlformats.org/markup-compatibility/2006">
+        <mc:Choice xmlns:a14="http://schemas.microsoft.com/office/drawing/2010/main" Requires="a14">
+          <p:sp>
+            <p:nvSpPr>
+              <p:cNvPr id="6" name="TextBox 5"/>
+              <p:cNvSpPr txBox="1"/>
+              <p:nvPr/>
+            </p:nvSpPr>
+            <p:spPr>
+              <a:xfrm>
+                <a:off x="6520248" y="1808395"/>
+                <a:ext cx="2166552" cy="333681"/>
+              </a:xfrm>
+              <a:prstGeom prst="rect">
+                <a:avLst/>
+              </a:prstGeom>
+              <a:noFill/>
+            </p:spPr>
+            <p:txBody>
+              <a:bodyPr wrap="square" lIns="0" tIns="0" rIns="0" bIns="0" rtlCol="0">
+                <a:spAutoFit/>
+              </a:bodyPr>
+              <a:lstStyle/>
+              <a:p>
+                <a:pPr/>
+                <a14:m>
+                  <m:oMathPara xmlns:m="http://schemas.openxmlformats.org/officeDocument/2006/math">
+                    <m:oMathParaPr>
+                      <m:jc m:val="centerGroup"/>
+                    </m:oMathParaPr>
+                    <m:oMath xmlns:m="http://schemas.openxmlformats.org/officeDocument/2006/math">
+                      <m:sSub>
+                        <m:sSubPr>
+                          <m:ctrlPr>
+                            <a:rPr lang="en-US" sz="1600" b="0" i="1" smtClean="0">
+                              <a:latin typeface="Cambria Math" panose="02040503050406030204" pitchFamily="18" charset="0"/>
+                            </a:rPr>
+                          </m:ctrlPr>
+                        </m:sSubPr>
+                        <m:e>
+                          <m:r>
+                            <a:rPr lang="en-US" sz="1600" b="0" i="1" smtClean="0">
+                              <a:latin typeface="Cambria Math" panose="02040503050406030204" pitchFamily="18" charset="0"/>
+                            </a:rPr>
+                            <m:t>𝐵</m:t>
+                          </m:r>
+                        </m:e>
+                        <m:sub>
+                          <m:r>
+                            <a:rPr lang="en-US" sz="1600" b="0" i="1" smtClean="0">
+                              <a:latin typeface="Cambria Math" panose="02040503050406030204" pitchFamily="18" charset="0"/>
+                            </a:rPr>
+                            <m:t>𝑚</m:t>
+                          </m:r>
+                        </m:sub>
+                      </m:sSub>
+                      <m:r>
+                        <a:rPr lang="en-US" sz="1600" b="0" i="1" smtClean="0">
+                          <a:latin typeface="Cambria Math" panose="02040503050406030204" pitchFamily="18" charset="0"/>
+                        </a:rPr>
+                        <m:t>=</m:t>
+                      </m:r>
+                      <m:box>
+                        <m:boxPr>
+                          <m:ctrlPr>
+                            <a:rPr lang="en-US" sz="1600" b="0" i="1" smtClean="0">
+                              <a:latin typeface="Cambria Math" panose="02040503050406030204" pitchFamily="18" charset="0"/>
+                            </a:rPr>
+                          </m:ctrlPr>
+                        </m:boxPr>
+                        <m:e>
+                          <m:argPr>
+                            <m:argSz m:val="-1"/>
+                          </m:argPr>
+                          <m:f>
+                            <m:fPr>
+                              <m:ctrlPr>
+                                <a:rPr lang="en-US" sz="1600" b="0" i="1" smtClean="0">
+                                  <a:latin typeface="Cambria Math" panose="02040503050406030204" pitchFamily="18" charset="0"/>
+                                </a:rPr>
+                              </m:ctrlPr>
+                            </m:fPr>
+                            <m:num>
+                              <m:r>
+                                <m:rPr>
+                                  <m:sty m:val="p"/>
+                                </m:rPr>
+                                <a:rPr lang="en-US" sz="1600" b="0" i="0" smtClean="0">
+                                  <a:latin typeface="Cambria Math" panose="02040503050406030204" pitchFamily="18" charset="0"/>
+                                </a:rPr>
+                                <m:t>memory</m:t>
+                              </m:r>
+                              <m:r>
+                                <a:rPr lang="en-US" sz="1600" b="0" i="1" smtClean="0">
+                                  <a:latin typeface="Cambria Math" panose="02040503050406030204" pitchFamily="18" charset="0"/>
+                                </a:rPr>
+                                <m:t> </m:t>
+                              </m:r>
+                              <m:r>
+                                <m:rPr>
+                                  <m:sty m:val="p"/>
+                                </m:rPr>
+                                <a:rPr lang="en-US" sz="1600" b="0" i="0" smtClean="0">
+                                  <a:latin typeface="Cambria Math" panose="02040503050406030204" pitchFamily="18" charset="0"/>
+                                </a:rPr>
+                                <m:t>bandwidth</m:t>
+                              </m:r>
+                            </m:num>
+                            <m:den>
+                              <m:r>
+                                <m:rPr>
+                                  <m:sty m:val="p"/>
+                                </m:rPr>
+                                <a:rPr lang="en-US" sz="1600" b="0" i="0" smtClean="0">
+                                  <a:latin typeface="Cambria Math" panose="02040503050406030204" pitchFamily="18" charset="0"/>
+                                </a:rPr>
+                                <m:t>FLOPS</m:t>
+                              </m:r>
+                              <m:r>
+                                <a:rPr lang="en-US" sz="1600" b="0" i="1" smtClean="0">
+                                  <a:latin typeface="Cambria Math" panose="02040503050406030204" pitchFamily="18" charset="0"/>
+                                </a:rPr>
+                                <m:t>/</m:t>
+                              </m:r>
+                              <m:r>
+                                <a:rPr lang="en-US" sz="1600" b="0" i="1" smtClean="0">
+                                  <a:latin typeface="Cambria Math" panose="02040503050406030204" pitchFamily="18" charset="0"/>
+                                </a:rPr>
+                                <m:t>𝑠</m:t>
+                              </m:r>
+                            </m:den>
+                          </m:f>
+                        </m:e>
+                      </m:box>
+                    </m:oMath>
+                  </m:oMathPara>
+                </a14:m>
+                <a:endParaRPr lang="en-US" sz="1600" dirty="0"/>
+              </a:p>
+            </p:txBody>
+          </p:sp>
+        </mc:Choice>
+        <mc:Fallback>
+          <p:sp>
+            <p:nvSpPr>
+              <p:cNvPr id="6" name="TextBox 5"/>
+              <p:cNvSpPr txBox="1">
+                <a:spLocks noRot="1" noChangeAspect="1" noMove="1" noResize="1" noEditPoints="1" noAdjustHandles="1" noChangeArrowheads="1" noChangeShapeType="1" noTextEdit="1"/>
+              </p:cNvSpPr>
+              <p:nvPr/>
+            </p:nvSpPr>
+            <p:spPr>
+              <a:xfrm>
+                <a:off x="6520248" y="1808395"/>
+                <a:ext cx="2166552" cy="333681"/>
+              </a:xfrm>
+              <a:prstGeom prst="rect">
+                <a:avLst/>
+              </a:prstGeom>
+              <a:blipFill>
+                <a:blip r:embed="rId3"/>
+                <a:stretch>
+                  <a:fillRect b="-20370"/>
+                </a:stretch>
+              </a:blipFill>
+            </p:spPr>
+            <p:txBody>
+              <a:bodyPr/>
+              <a:lstStyle/>
+              <a:p>
+                <a:r>
+                  <a:rPr lang="en-US">
+                    <a:noFill/>
+                  </a:rPr>
+                  <a:t> </a:t>
+                </a:r>
+              </a:p>
+            </p:txBody>
+          </p:sp>
+        </mc:Fallback>
+      </mc:AlternateContent>
+      <mc:AlternateContent xmlns:mc="http://schemas.openxmlformats.org/markup-compatibility/2006">
+        <mc:Choice xmlns:a14="http://schemas.microsoft.com/office/drawing/2010/main" Requires="a14">
+          <p:sp>
+            <p:nvSpPr>
+              <p:cNvPr id="7" name="TextBox 6"/>
+              <p:cNvSpPr txBox="1"/>
+              <p:nvPr/>
+            </p:nvSpPr>
+            <p:spPr>
+              <a:xfrm>
+                <a:off x="6520248" y="3847256"/>
+                <a:ext cx="1501346" cy="301621"/>
+              </a:xfrm>
+              <a:prstGeom prst="rect">
+                <a:avLst/>
+              </a:prstGeom>
+              <a:noFill/>
+            </p:spPr>
+            <p:txBody>
+              <a:bodyPr wrap="square" lIns="0" tIns="0" rIns="0" bIns="0" rtlCol="0">
+                <a:spAutoFit/>
+              </a:bodyPr>
+              <a:lstStyle/>
+              <a:p>
+                <a:pPr/>
+                <a14:m>
+                  <m:oMathPara xmlns:m="http://schemas.openxmlformats.org/officeDocument/2006/math">
+                    <m:oMathParaPr>
+                      <m:jc m:val="centerGroup"/>
+                    </m:oMathParaPr>
+                    <m:oMath xmlns:m="http://schemas.openxmlformats.org/officeDocument/2006/math">
+                      <m:sSub>
+                        <m:sSubPr>
+                          <m:ctrlPr>
+                            <a:rPr lang="en-US" sz="1600" b="0" i="1" smtClean="0">
+                              <a:latin typeface="Cambria Math" panose="02040503050406030204" pitchFamily="18" charset="0"/>
+                            </a:rPr>
+                          </m:ctrlPr>
+                        </m:sSubPr>
+                        <m:e>
+                          <m:r>
+                            <a:rPr lang="en-US" sz="1600" b="0" i="1" smtClean="0">
+                              <a:latin typeface="Cambria Math" panose="02040503050406030204" pitchFamily="18" charset="0"/>
+                            </a:rPr>
+                            <m:t>𝐵</m:t>
+                          </m:r>
+                        </m:e>
+                        <m:sub>
+                          <m:r>
+                            <a:rPr lang="en-US" sz="1600" b="0" i="1" smtClean="0">
+                              <a:latin typeface="Cambria Math" panose="02040503050406030204" pitchFamily="18" charset="0"/>
+                            </a:rPr>
+                            <m:t>𝑐</m:t>
+                          </m:r>
+                        </m:sub>
+                      </m:sSub>
+                      <m:r>
+                        <a:rPr lang="en-US" sz="1600" b="0" i="1" smtClean="0">
+                          <a:latin typeface="Cambria Math" panose="02040503050406030204" pitchFamily="18" charset="0"/>
+                        </a:rPr>
+                        <m:t>=</m:t>
+                      </m:r>
+                      <m:box>
+                        <m:boxPr>
+                          <m:ctrlPr>
+                            <a:rPr lang="en-US" sz="1600" b="0" i="1" smtClean="0">
+                              <a:latin typeface="Cambria Math" panose="02040503050406030204" pitchFamily="18" charset="0"/>
+                            </a:rPr>
+                          </m:ctrlPr>
+                        </m:boxPr>
+                        <m:e>
+                          <m:argPr>
+                            <m:argSz m:val="-1"/>
+                          </m:argPr>
+                          <m:f>
+                            <m:fPr>
+                              <m:ctrlPr>
+                                <a:rPr lang="en-US" sz="1600" b="0" i="1" smtClean="0">
+                                  <a:latin typeface="Cambria Math" panose="02040503050406030204" pitchFamily="18" charset="0"/>
+                                </a:rPr>
+                              </m:ctrlPr>
+                            </m:fPr>
+                            <m:num>
+                              <m:r>
+                                <m:rPr>
+                                  <m:sty m:val="p"/>
+                                </m:rPr>
+                                <a:rPr lang="en-US" sz="1600" b="0" i="0" smtClean="0">
+                                  <a:latin typeface="Cambria Math" panose="02040503050406030204" pitchFamily="18" charset="0"/>
+                                </a:rPr>
+                                <m:t>data</m:t>
+                              </m:r>
+                              <m:r>
+                                <a:rPr lang="en-US" sz="1600" b="0" i="0" smtClean="0">
+                                  <a:latin typeface="Cambria Math" panose="02040503050406030204" pitchFamily="18" charset="0"/>
+                                </a:rPr>
+                                <m:t> </m:t>
+                              </m:r>
+                              <m:r>
+                                <m:rPr>
+                                  <m:sty m:val="p"/>
+                                </m:rPr>
+                                <a:rPr lang="en-US" sz="1600" b="0" i="0" smtClean="0">
+                                  <a:latin typeface="Cambria Math" panose="02040503050406030204" pitchFamily="18" charset="0"/>
+                                </a:rPr>
+                                <m:t>transfer</m:t>
+                              </m:r>
+                            </m:num>
+                            <m:den>
+                              <m:r>
+                                <m:rPr>
+                                  <m:sty m:val="p"/>
+                                </m:rPr>
+                                <a:rPr lang="en-US" sz="1600" b="0" i="0" smtClean="0">
+                                  <a:latin typeface="Cambria Math" panose="02040503050406030204" pitchFamily="18" charset="0"/>
+                                </a:rPr>
+                                <m:t>FLOPS</m:t>
+                              </m:r>
+                            </m:den>
+                          </m:f>
+                        </m:e>
+                      </m:box>
+                    </m:oMath>
+                  </m:oMathPara>
+                </a14:m>
+                <a:endParaRPr lang="en-US" sz="1600" dirty="0"/>
+              </a:p>
+            </p:txBody>
+          </p:sp>
+        </mc:Choice>
+        <mc:Fallback>
+          <p:sp>
+            <p:nvSpPr>
+              <p:cNvPr id="7" name="TextBox 6"/>
+              <p:cNvSpPr txBox="1">
+                <a:spLocks noRot="1" noChangeAspect="1" noMove="1" noResize="1" noEditPoints="1" noAdjustHandles="1" noChangeArrowheads="1" noChangeShapeType="1" noTextEdit="1"/>
+              </p:cNvSpPr>
+              <p:nvPr/>
+            </p:nvSpPr>
+            <p:spPr>
+              <a:xfrm>
+                <a:off x="6520248" y="3847256"/>
+                <a:ext cx="1501346" cy="301621"/>
+              </a:xfrm>
+              <a:prstGeom prst="rect">
+                <a:avLst/>
+              </a:prstGeom>
+              <a:blipFill>
+                <a:blip r:embed="rId4"/>
+                <a:stretch>
+                  <a:fillRect l="-1626" b="-16000"/>
+                </a:stretch>
+              </a:blipFill>
+            </p:spPr>
+            <p:txBody>
+              <a:bodyPr/>
+              <a:lstStyle/>
+              <a:p>
+                <a:r>
+                  <a:rPr lang="en-US">
+                    <a:noFill/>
+                  </a:rPr>
+                  <a:t> </a:t>
+                </a:r>
+              </a:p>
+            </p:txBody>
+          </p:sp>
+        </mc:Fallback>
+      </mc:AlternateContent>
+      <mc:AlternateContent xmlns:mc="http://schemas.openxmlformats.org/markup-compatibility/2006">
+        <mc:Choice xmlns:a14="http://schemas.microsoft.com/office/drawing/2010/main" Requires="a14">
+          <p:sp>
+            <p:nvSpPr>
+              <p:cNvPr id="8" name="TextBox 7"/>
+              <p:cNvSpPr txBox="1"/>
+              <p:nvPr/>
+            </p:nvSpPr>
+            <p:spPr>
+              <a:xfrm>
+                <a:off x="823784" y="6124126"/>
+                <a:ext cx="1787611" cy="248325"/>
+              </a:xfrm>
+              <a:prstGeom prst="rect">
+                <a:avLst/>
+              </a:prstGeom>
+              <a:noFill/>
+            </p:spPr>
+            <p:txBody>
+              <a:bodyPr wrap="square" lIns="0" tIns="0" rIns="0" bIns="0" rtlCol="0">
+                <a:spAutoFit/>
+              </a:bodyPr>
+              <a:lstStyle/>
+              <a:p>
+                <a:pPr/>
+                <a14:m>
+                  <m:oMathPara xmlns:m="http://schemas.openxmlformats.org/officeDocument/2006/math">
+                    <m:oMathParaPr>
+                      <m:jc m:val="centerGroup"/>
+                    </m:oMathParaPr>
+                    <m:oMath xmlns:m="http://schemas.openxmlformats.org/officeDocument/2006/math">
+                      <m:r>
+                        <a:rPr lang="en-US" sz="1600" b="0" i="1" smtClean="0">
+                          <a:latin typeface="Cambria Math" panose="02040503050406030204" pitchFamily="18" charset="0"/>
+                          <a:ea typeface="Cambria Math" panose="02040503050406030204" pitchFamily="18" charset="0"/>
+                        </a:rPr>
+                        <m:t>ℓ</m:t>
+                      </m:r>
+                      <m:r>
+                        <a:rPr lang="en-US" sz="1600" b="0" i="1" smtClean="0">
+                          <a:latin typeface="Cambria Math" panose="02040503050406030204" pitchFamily="18" charset="0"/>
+                        </a:rPr>
+                        <m:t>= </m:t>
+                      </m:r>
+                      <m:f>
+                        <m:fPr>
+                          <m:type m:val="lin"/>
+                          <m:ctrlPr>
+                            <a:rPr lang="en-US" sz="1600" b="0" i="1" smtClean="0">
+                              <a:latin typeface="Cambria Math" panose="02040503050406030204" pitchFamily="18" charset="0"/>
+                            </a:rPr>
+                          </m:ctrlPr>
+                        </m:fPr>
+                        <m:num>
+                          <m:r>
+                            <m:rPr>
+                              <m:sty m:val="p"/>
+                            </m:rPr>
+                            <a:rPr lang="en-US" sz="1600" b="0" i="0" smtClean="0">
+                              <a:latin typeface="Cambria Math" panose="02040503050406030204" pitchFamily="18" charset="0"/>
+                            </a:rPr>
+                            <m:t>min</m:t>
+                          </m:r>
+                          <m:r>
+                            <a:rPr lang="en-US" sz="1600" b="0" i="1" smtClean="0">
+                              <a:latin typeface="Cambria Math" panose="02040503050406030204" pitchFamily="18" charset="0"/>
+                            </a:rPr>
+                            <m:t>⁡(1,</m:t>
+                          </m:r>
+                          <m:sSub>
+                            <m:sSubPr>
+                              <m:ctrlPr>
+                                <a:rPr lang="en-US" sz="1600" i="1">
+                                  <a:latin typeface="Cambria Math" panose="02040503050406030204" pitchFamily="18" charset="0"/>
+                                </a:rPr>
+                              </m:ctrlPr>
+                            </m:sSubPr>
+                            <m:e>
+                              <m:r>
+                                <a:rPr lang="en-US" sz="1600" b="0" i="1" smtClean="0">
+                                  <a:latin typeface="Cambria Math" panose="02040503050406030204" pitchFamily="18" charset="0"/>
+                                </a:rPr>
+                                <m:t>𝐵</m:t>
+                              </m:r>
+                            </m:e>
+                            <m:sub>
+                              <m:r>
+                                <a:rPr lang="en-US" sz="1600" b="0" i="1" smtClean="0">
+                                  <a:latin typeface="Cambria Math" panose="02040503050406030204" pitchFamily="18" charset="0"/>
+                                </a:rPr>
+                                <m:t>𝑚</m:t>
+                              </m:r>
+                            </m:sub>
+                          </m:sSub>
+                        </m:num>
+                        <m:den>
+                          <m:sSub>
+                            <m:sSubPr>
+                              <m:ctrlPr>
+                                <a:rPr lang="en-US" sz="1600" i="1">
+                                  <a:latin typeface="Cambria Math" panose="02040503050406030204" pitchFamily="18" charset="0"/>
+                                </a:rPr>
+                              </m:ctrlPr>
+                            </m:sSubPr>
+                            <m:e>
+                              <m:r>
+                                <a:rPr lang="en-US" sz="1600" i="1">
+                                  <a:latin typeface="Cambria Math" panose="02040503050406030204" pitchFamily="18" charset="0"/>
+                                </a:rPr>
+                                <m:t>𝐵</m:t>
+                              </m:r>
+                            </m:e>
+                            <m:sub>
+                              <m:r>
+                                <a:rPr lang="en-US" sz="1600" i="1">
+                                  <a:latin typeface="Cambria Math" panose="02040503050406030204" pitchFamily="18" charset="0"/>
+                                </a:rPr>
+                                <m:t>𝑐</m:t>
+                              </m:r>
+                            </m:sub>
+                          </m:sSub>
+                        </m:den>
+                      </m:f>
+                      <m:r>
+                        <a:rPr lang="en-US" sz="1600" b="0" i="1" smtClean="0">
+                          <a:latin typeface="Cambria Math" panose="02040503050406030204" pitchFamily="18" charset="0"/>
+                        </a:rPr>
+                        <m:t>)</m:t>
+                      </m:r>
+                    </m:oMath>
+                  </m:oMathPara>
+                </a14:m>
+                <a:endParaRPr lang="en-US" sz="1600" dirty="0"/>
+              </a:p>
+            </p:txBody>
+          </p:sp>
+        </mc:Choice>
+        <mc:Fallback>
+          <p:sp>
+            <p:nvSpPr>
+              <p:cNvPr id="8" name="TextBox 7"/>
+              <p:cNvSpPr txBox="1">
+                <a:spLocks noRot="1" noChangeAspect="1" noMove="1" noResize="1" noEditPoints="1" noAdjustHandles="1" noChangeArrowheads="1" noChangeShapeType="1" noTextEdit="1"/>
+              </p:cNvSpPr>
+              <p:nvPr/>
+            </p:nvSpPr>
+            <p:spPr>
+              <a:xfrm>
+                <a:off x="823784" y="6124126"/>
+                <a:ext cx="1787611" cy="248325"/>
+              </a:xfrm>
+              <a:prstGeom prst="rect">
+                <a:avLst/>
+              </a:prstGeom>
+              <a:blipFill>
+                <a:blip r:embed="rId5"/>
+                <a:stretch>
+                  <a:fillRect l="-1365" t="-162500" r="-17065" b="-247500"/>
+                </a:stretch>
+              </a:blipFill>
+            </p:spPr>
+            <p:txBody>
+              <a:bodyPr/>
+              <a:lstStyle/>
+              <a:p>
+                <a:r>
+                  <a:rPr lang="en-US">
+                    <a:noFill/>
+                  </a:rPr>
+                  <a:t> </a:t>
+                </a:r>
+              </a:p>
+            </p:txBody>
+          </p:sp>
+        </mc:Fallback>
+      </mc:AlternateContent>
+      <mc:AlternateContent xmlns:mc="http://schemas.openxmlformats.org/markup-compatibility/2006">
+        <mc:Choice xmlns:a14="http://schemas.microsoft.com/office/drawing/2010/main" Requires="a14">
+          <p:sp>
+            <p:nvSpPr>
+              <p:cNvPr id="9" name="TextBox 8"/>
+              <p:cNvSpPr txBox="1"/>
+              <p:nvPr/>
+            </p:nvSpPr>
+            <p:spPr>
+              <a:xfrm>
+                <a:off x="3161271" y="6124126"/>
+                <a:ext cx="4205416" cy="246221"/>
+              </a:xfrm>
+              <a:prstGeom prst="rect">
+                <a:avLst/>
+              </a:prstGeom>
+              <a:noFill/>
+            </p:spPr>
+            <p:txBody>
+              <a:bodyPr wrap="square" lIns="0" tIns="0" rIns="0" bIns="0" rtlCol="0">
+                <a:spAutoFit/>
+              </a:bodyPr>
+              <a:lstStyle/>
+              <a:p>
+                <a:r>
+                  <a:rPr lang="en-US" sz="1600" b="0" dirty="0" smtClean="0">
+                    <a:ea typeface="Cambria Math" panose="02040503050406030204" pitchFamily="18" charset="0"/>
+                  </a:rPr>
+                  <a:t>P = </a:t>
+                </a:r>
+                <a14:m>
+                  <m:oMath xmlns:m="http://schemas.openxmlformats.org/officeDocument/2006/math">
+                    <m:r>
+                      <a:rPr lang="en-US" sz="1600" b="0" i="1" smtClean="0">
+                        <a:latin typeface="Cambria Math" panose="02040503050406030204" pitchFamily="18" charset="0"/>
+                        <a:ea typeface="Cambria Math" panose="02040503050406030204" pitchFamily="18" charset="0"/>
+                      </a:rPr>
+                      <m:t>ℓ</m:t>
+                    </m:r>
+                    <m:sSub>
+                      <m:sSubPr>
+                        <m:ctrlPr>
+                          <a:rPr lang="en-US" sz="1600" b="0" i="1" smtClean="0">
+                            <a:latin typeface="Cambria Math" panose="02040503050406030204" pitchFamily="18" charset="0"/>
+                          </a:rPr>
+                        </m:ctrlPr>
+                      </m:sSubPr>
+                      <m:e>
+                        <m:r>
+                          <a:rPr lang="en-US" sz="1600" b="0" i="1" smtClean="0">
+                            <a:latin typeface="Cambria Math" panose="02040503050406030204" pitchFamily="18" charset="0"/>
+                          </a:rPr>
+                          <m:t>𝑃</m:t>
+                        </m:r>
+                      </m:e>
+                      <m:sub>
+                        <m:r>
+                          <m:rPr>
+                            <m:sty m:val="p"/>
+                          </m:rPr>
+                          <a:rPr lang="en-US" sz="1600" b="0" i="0" smtClean="0">
+                            <a:latin typeface="Cambria Math" panose="02040503050406030204" pitchFamily="18" charset="0"/>
+                          </a:rPr>
+                          <m:t>max</m:t>
+                        </m:r>
+                      </m:sub>
+                    </m:sSub>
+                  </m:oMath>
+                </a14:m>
+                <a:endParaRPr lang="en-US" sz="1600" dirty="0"/>
+              </a:p>
+            </p:txBody>
+          </p:sp>
+        </mc:Choice>
+        <mc:Fallback>
+          <p:sp>
+            <p:nvSpPr>
+              <p:cNvPr id="9" name="TextBox 8"/>
+              <p:cNvSpPr txBox="1">
+                <a:spLocks noRot="1" noChangeAspect="1" noMove="1" noResize="1" noEditPoints="1" noAdjustHandles="1" noChangeArrowheads="1" noChangeShapeType="1" noTextEdit="1"/>
+              </p:cNvSpPr>
+              <p:nvPr/>
+            </p:nvSpPr>
+            <p:spPr>
+              <a:xfrm>
+                <a:off x="3161271" y="6124126"/>
+                <a:ext cx="4205416" cy="246221"/>
+              </a:xfrm>
+              <a:prstGeom prst="rect">
+                <a:avLst/>
+              </a:prstGeom>
+              <a:blipFill>
+                <a:blip r:embed="rId6"/>
+                <a:stretch>
+                  <a:fillRect l="-3048" t="-27500" b="-50000"/>
+                </a:stretch>
+              </a:blipFill>
+            </p:spPr>
+            <p:txBody>
+              <a:bodyPr/>
+              <a:lstStyle/>
+              <a:p>
+                <a:r>
+                  <a:rPr lang="en-US">
+                    <a:noFill/>
+                  </a:rPr>
+                  <a:t> </a:t>
+                </a:r>
+              </a:p>
+            </p:txBody>
+          </p:sp>
+        </mc:Fallback>
+      </mc:AlternateContent>
     </p:spTree>
     <p:extLst>
       <p:ext uri="{BB962C8B-B14F-4D97-AF65-F5344CB8AC3E}">
@@ -6375,6 +7053,33 @@
                                   </p:childTnLst>
                                 </p:cTn>
                               </p:par>
+                              <p:par>
+                                <p:cTn id="7" presetID="1" presetClass="entr" presetSubtype="0" fill="hold" grpId="0" nodeType="withEffect">
+                                  <p:stCondLst>
+                                    <p:cond delay="0"/>
+                                  </p:stCondLst>
+                                  <p:childTnLst>
+                                    <p:set>
+                                      <p:cBhvr>
+                                        <p:cTn id="8" dur="1" fill="hold">
+                                          <p:stCondLst>
+                                            <p:cond delay="0"/>
+                                          </p:stCondLst>
+                                        </p:cTn>
+                                        <p:tgtEl>
+                                          <p:spTgt spid="6"/>
+                                        </p:tgtEl>
+                                        <p:attrNameLst>
+                                          <p:attrName>style.visibility</p:attrName>
+                                        </p:attrNameLst>
+                                      </p:cBhvr>
+                                      <p:to>
+                                        <p:strVal val="visible"/>
+                                      </p:to>
+                                    </p:set>
+                                  </p:childTnLst>
+                                </p:cTn>
+                              </p:par>
                             </p:childTnLst>
                           </p:cTn>
                         </p:par>
@@ -6382,26 +7087,26 @@
                     </p:cTn>
                   </p:par>
                   <p:par>
-                    <p:cTn id="7" fill="hold">
+                    <p:cTn id="9" fill="hold">
                       <p:stCondLst>
                         <p:cond delay="indefinite"/>
                       </p:stCondLst>
                       <p:childTnLst>
                         <p:par>
-                          <p:cTn id="8" fill="hold">
+                          <p:cTn id="10" fill="hold">
                             <p:stCondLst>
                               <p:cond delay="0"/>
                             </p:stCondLst>
                             <p:childTnLst>
                               <p:par>
-                                <p:cTn id="9" presetID="1" presetClass="entr" presetSubtype="0" fill="hold" grpId="0" nodeType="clickEffect">
+                                <p:cTn id="11" presetID="1" presetClass="entr" presetSubtype="0" fill="hold" grpId="0" nodeType="clickEffect">
                                   <p:stCondLst>
                                     <p:cond delay="0"/>
                                   </p:stCondLst>
                                   <p:childTnLst>
                                     <p:set>
                                       <p:cBhvr>
-                                        <p:cTn id="10" dur="1" fill="hold">
+                                        <p:cTn id="12" dur="1" fill="hold">
                                           <p:stCondLst>
                                             <p:cond delay="0"/>
                                           </p:stCondLst>
@@ -6431,26 +7136,26 @@
                     </p:cTn>
                   </p:par>
                   <p:par>
-                    <p:cTn id="11" fill="hold">
+                    <p:cTn id="13" fill="hold">
                       <p:stCondLst>
                         <p:cond delay="indefinite"/>
                       </p:stCondLst>
                       <p:childTnLst>
                         <p:par>
-                          <p:cTn id="12" fill="hold">
+                          <p:cTn id="14" fill="hold">
                             <p:stCondLst>
                               <p:cond delay="0"/>
                             </p:stCondLst>
                             <p:childTnLst>
                               <p:par>
-                                <p:cTn id="13" presetID="1" presetClass="entr" presetSubtype="0" fill="hold" grpId="0" nodeType="clickEffect">
+                                <p:cTn id="15" presetID="1" presetClass="entr" presetSubtype="0" fill="hold" grpId="0" nodeType="clickEffect">
                                   <p:stCondLst>
                                     <p:cond delay="0"/>
                                   </p:stCondLst>
                                   <p:childTnLst>
                                     <p:set>
                                       <p:cBhvr>
-                                        <p:cTn id="14" dur="1" fill="hold">
+                                        <p:cTn id="16" dur="1" fill="hold">
                                           <p:stCondLst>
                                             <p:cond delay="0"/>
                                           </p:stCondLst>
@@ -6480,26 +7185,26 @@
                     </p:cTn>
                   </p:par>
                   <p:par>
-                    <p:cTn id="15" fill="hold">
+                    <p:cTn id="17" fill="hold">
                       <p:stCondLst>
                         <p:cond delay="indefinite"/>
                       </p:stCondLst>
                       <p:childTnLst>
                         <p:par>
-                          <p:cTn id="16" fill="hold">
+                          <p:cTn id="18" fill="hold">
                             <p:stCondLst>
                               <p:cond delay="0"/>
                             </p:stCondLst>
                             <p:childTnLst>
                               <p:par>
-                                <p:cTn id="17" presetID="1" presetClass="entr" presetSubtype="0" fill="hold" grpId="0" nodeType="clickEffect">
+                                <p:cTn id="19" presetID="1" presetClass="entr" presetSubtype="0" fill="hold" grpId="0" nodeType="clickEffect">
                                   <p:stCondLst>
                                     <p:cond delay="0"/>
                                   </p:stCondLst>
                                   <p:childTnLst>
                                     <p:set>
                                       <p:cBhvr>
-                                        <p:cTn id="18" dur="1" fill="hold">
+                                        <p:cTn id="20" dur="1" fill="hold">
                                           <p:stCondLst>
                                             <p:cond delay="0"/>
                                           </p:stCondLst>
@@ -6529,26 +7234,26 @@
                     </p:cTn>
                   </p:par>
                   <p:par>
-                    <p:cTn id="19" fill="hold">
+                    <p:cTn id="21" fill="hold">
                       <p:stCondLst>
                         <p:cond delay="indefinite"/>
                       </p:stCondLst>
                       <p:childTnLst>
                         <p:par>
-                          <p:cTn id="20" fill="hold">
+                          <p:cTn id="22" fill="hold">
                             <p:stCondLst>
                               <p:cond delay="0"/>
                             </p:stCondLst>
                             <p:childTnLst>
                               <p:par>
-                                <p:cTn id="21" presetID="1" presetClass="entr" presetSubtype="0" fill="hold" grpId="0" nodeType="clickEffect">
+                                <p:cTn id="23" presetID="1" presetClass="entr" presetSubtype="0" fill="hold" grpId="0" nodeType="clickEffect">
                                   <p:stCondLst>
                                     <p:cond delay="0"/>
                                   </p:stCondLst>
                                   <p:childTnLst>
                                     <p:set>
                                       <p:cBhvr>
-                                        <p:cTn id="22" dur="1" fill="hold">
+                                        <p:cTn id="24" dur="1" fill="hold">
                                           <p:stCondLst>
                                             <p:cond delay="0"/>
                                           </p:stCondLst>
@@ -6572,20 +7277,20 @@
                                 </p:cTn>
                               </p:par>
                               <p:par>
-                                <p:cTn id="23" presetID="1" presetClass="entr" presetSubtype="0" fill="hold" grpId="0" nodeType="withEffect">
+                                <p:cTn id="25" presetID="1" presetClass="entr" presetSubtype="0" fill="hold" grpId="0" nodeType="withEffect">
                                   <p:stCondLst>
                                     <p:cond delay="0"/>
                                   </p:stCondLst>
                                   <p:childTnLst>
                                     <p:set>
                                       <p:cBhvr>
-                                        <p:cTn id="24" dur="1" fill="hold">
+                                        <p:cTn id="26" dur="1" fill="hold">
                                           <p:stCondLst>
                                             <p:cond delay="0"/>
                                           </p:stCondLst>
                                         </p:cTn>
                                         <p:tgtEl>
-                                          <p:spTgt spid="5"/>
+                                          <p:spTgt spid="7"/>
                                         </p:tgtEl>
                                         <p:attrNameLst>
                                           <p:attrName>style.visibility</p:attrName>
@@ -6598,26 +7303,8 @@
                                   </p:childTnLst>
                                 </p:cTn>
                               </p:par>
-                            </p:childTnLst>
-                          </p:cTn>
-                        </p:par>
-                      </p:childTnLst>
-                    </p:cTn>
-                  </p:par>
-                  <p:par>
-                    <p:cTn id="25" fill="hold">
-                      <p:stCondLst>
-                        <p:cond delay="indefinite"/>
-                      </p:stCondLst>
-                      <p:childTnLst>
-                        <p:par>
-                          <p:cTn id="26" fill="hold">
-                            <p:stCondLst>
-                              <p:cond delay="0"/>
-                            </p:stCondLst>
-                            <p:childTnLst>
                               <p:par>
-                                <p:cTn id="27" presetID="1" presetClass="entr" presetSubtype="0" fill="hold" grpId="0" nodeType="clickEffect">
+                                <p:cTn id="27" presetID="1" presetClass="entr" presetSubtype="0" fill="hold" grpId="0" nodeType="withEffect">
                                   <p:stCondLst>
                                     <p:cond delay="0"/>
                                   </p:stCondLst>
@@ -6630,11 +7317,7 @@
                                           </p:stCondLst>
                                         </p:cTn>
                                         <p:tgtEl>
-                                          <p:spTgt spid="3">
-                                            <p:txEl>
-                                              <p:pRg st="5" end="5"/>
-                                            </p:txEl>
-                                          </p:spTgt>
+                                          <p:spTgt spid="5"/>
                                         </p:tgtEl>
                                         <p:attrNameLst>
                                           <p:attrName>style.visibility</p:attrName>
@@ -6681,7 +7364,7 @@
                                         <p:tgtEl>
                                           <p:spTgt spid="3">
                                             <p:txEl>
-                                              <p:pRg st="6" end="6"/>
+                                              <p:pRg st="5" end="5"/>
                                             </p:txEl>
                                           </p:spTgt>
                                         </p:tgtEl>
@@ -6730,7 +7413,7 @@
                                         <p:tgtEl>
                                           <p:spTgt spid="3">
                                             <p:txEl>
-                                              <p:pRg st="7" end="7"/>
+                                              <p:pRg st="6" end="6"/>
                                             </p:txEl>
                                           </p:spTgt>
                                         </p:tgtEl>
@@ -6779,7 +7462,7 @@
                                         <p:tgtEl>
                                           <p:spTgt spid="3">
                                             <p:txEl>
-                                              <p:pRg st="8" end="8"/>
+                                              <p:pRg st="7" end="7"/>
                                             </p:txEl>
                                           </p:spTgt>
                                         </p:tgtEl>
@@ -6828,9 +7511,112 @@
                                         <p:tgtEl>
                                           <p:spTgt spid="3">
                                             <p:txEl>
+                                              <p:pRg st="8" end="8"/>
+                                            </p:txEl>
+                                          </p:spTgt>
+                                        </p:tgtEl>
+                                        <p:attrNameLst>
+                                          <p:attrName>style.visibility</p:attrName>
+                                        </p:attrNameLst>
+                                      </p:cBhvr>
+                                      <p:to>
+                                        <p:strVal val="visible"/>
+                                      </p:to>
+                                    </p:set>
+                                  </p:childTnLst>
+                                </p:cTn>
+                              </p:par>
+                              <p:par>
+                                <p:cTn id="45" presetID="1" presetClass="entr" presetSubtype="0" fill="hold" grpId="0" nodeType="withEffect">
+                                  <p:stCondLst>
+                                    <p:cond delay="0"/>
+                                  </p:stCondLst>
+                                  <p:childTnLst>
+                                    <p:set>
+                                      <p:cBhvr>
+                                        <p:cTn id="46" dur="1" fill="hold">
+                                          <p:stCondLst>
+                                            <p:cond delay="0"/>
+                                          </p:stCondLst>
+                                        </p:cTn>
+                                        <p:tgtEl>
+                                          <p:spTgt spid="8"/>
+                                        </p:tgtEl>
+                                        <p:attrNameLst>
+                                          <p:attrName>style.visibility</p:attrName>
+                                        </p:attrNameLst>
+                                      </p:cBhvr>
+                                      <p:to>
+                                        <p:strVal val="visible"/>
+                                      </p:to>
+                                    </p:set>
+                                  </p:childTnLst>
+                                </p:cTn>
+                              </p:par>
+                            </p:childTnLst>
+                          </p:cTn>
+                        </p:par>
+                      </p:childTnLst>
+                    </p:cTn>
+                  </p:par>
+                  <p:par>
+                    <p:cTn id="47" fill="hold">
+                      <p:stCondLst>
+                        <p:cond delay="indefinite"/>
+                      </p:stCondLst>
+                      <p:childTnLst>
+                        <p:par>
+                          <p:cTn id="48" fill="hold">
+                            <p:stCondLst>
+                              <p:cond delay="0"/>
+                            </p:stCondLst>
+                            <p:childTnLst>
+                              <p:par>
+                                <p:cTn id="49" presetID="1" presetClass="entr" presetSubtype="0" fill="hold" grpId="0" nodeType="clickEffect">
+                                  <p:stCondLst>
+                                    <p:cond delay="0"/>
+                                  </p:stCondLst>
+                                  <p:childTnLst>
+                                    <p:set>
+                                      <p:cBhvr>
+                                        <p:cTn id="50" dur="1" fill="hold">
+                                          <p:stCondLst>
+                                            <p:cond delay="0"/>
+                                          </p:stCondLst>
+                                        </p:cTn>
+                                        <p:tgtEl>
+                                          <p:spTgt spid="3">
+                                            <p:txEl>
                                               <p:pRg st="9" end="9"/>
                                             </p:txEl>
                                           </p:spTgt>
+                                        </p:tgtEl>
+                                        <p:attrNameLst>
+                                          <p:attrName>style.visibility</p:attrName>
+                                        </p:attrNameLst>
+                                      </p:cBhvr>
+                                      <p:to>
+                                        <p:strVal val="visible"/>
+                                      </p:to>
+                                    </p:set>
+                                  </p:childTnLst>
+                                </p:cTn>
+                              </p:par>
+                              <p:par>
+                                <p:cTn id="51" presetID="1" presetClass="entr" presetSubtype="0" fill="hold" grpId="0" nodeType="withEffect">
+                                  <p:stCondLst>
+                                    <p:cond delay="0"/>
+                                  </p:stCondLst>
+                                  <p:childTnLst>
+                                    <p:set>
+                                      <p:cBhvr>
+                                        <p:cTn id="52" dur="1" fill="hold">
+                                          <p:stCondLst>
+                                            <p:cond delay="0"/>
+                                          </p:stCondLst>
+                                        </p:cTn>
+                                        <p:tgtEl>
+                                          <p:spTgt spid="9"/>
                                         </p:tgtEl>
                                         <p:attrNameLst>
                                           <p:attrName>style.visibility</p:attrName>
@@ -6873,6 +7659,10 @@
     <p:bldLst>
       <p:bldP spid="3" grpId="0" uiExpand="1" build="p"/>
       <p:bldP spid="5" grpId="0" animBg="1"/>
+      <p:bldP spid="6" grpId="0"/>
+      <p:bldP spid="7" grpId="0"/>
+      <p:bldP spid="8" grpId="0"/>
+      <p:bldP spid="9" grpId="0"/>
     </p:bldLst>
   </p:timing>
 </p:sld>

</xml_diff>